<commit_message>
moving ref params earlier
</commit_message>
<xml_diff>
--- a/ClassMaterials/ImperativeForm/34-imperative-form.pptx
+++ b/ClassMaterials/ImperativeForm/34-imperative-form.pptx
@@ -5,35 +5,38 @@
     <p:sldMasterId id="2147483648" r:id="rId1"/>
   </p:sldMasterIdLst>
   <p:notesMasterIdLst>
-    <p:notesMasterId r:id="rId25"/>
+    <p:notesMasterId r:id="rId28"/>
   </p:notesMasterIdLst>
   <p:handoutMasterIdLst>
-    <p:handoutMasterId r:id="rId26"/>
+    <p:handoutMasterId r:id="rId29"/>
   </p:handoutMasterIdLst>
   <p:sldIdLst>
     <p:sldId id="356" r:id="rId2"/>
-    <p:sldId id="444" r:id="rId3"/>
-    <p:sldId id="446" r:id="rId4"/>
-    <p:sldId id="447" r:id="rId5"/>
-    <p:sldId id="448" r:id="rId6"/>
-    <p:sldId id="449" r:id="rId7"/>
-    <p:sldId id="406" r:id="rId8"/>
-    <p:sldId id="407" r:id="rId9"/>
-    <p:sldId id="408" r:id="rId10"/>
-    <p:sldId id="409" r:id="rId11"/>
-    <p:sldId id="410" r:id="rId12"/>
-    <p:sldId id="411" r:id="rId13"/>
-    <p:sldId id="412" r:id="rId14"/>
-    <p:sldId id="413" r:id="rId15"/>
-    <p:sldId id="414" r:id="rId16"/>
-    <p:sldId id="415" r:id="rId17"/>
-    <p:sldId id="416" r:id="rId18"/>
-    <p:sldId id="417" r:id="rId19"/>
-    <p:sldId id="445" r:id="rId20"/>
-    <p:sldId id="418" r:id="rId21"/>
-    <p:sldId id="439" r:id="rId22"/>
-    <p:sldId id="423" r:id="rId23"/>
-    <p:sldId id="424" r:id="rId24"/>
+    <p:sldId id="450" r:id="rId3"/>
+    <p:sldId id="451" r:id="rId4"/>
+    <p:sldId id="452" r:id="rId5"/>
+    <p:sldId id="444" r:id="rId6"/>
+    <p:sldId id="446" r:id="rId7"/>
+    <p:sldId id="447" r:id="rId8"/>
+    <p:sldId id="448" r:id="rId9"/>
+    <p:sldId id="449" r:id="rId10"/>
+    <p:sldId id="406" r:id="rId11"/>
+    <p:sldId id="407" r:id="rId12"/>
+    <p:sldId id="408" r:id="rId13"/>
+    <p:sldId id="409" r:id="rId14"/>
+    <p:sldId id="410" r:id="rId15"/>
+    <p:sldId id="411" r:id="rId16"/>
+    <p:sldId id="412" r:id="rId17"/>
+    <p:sldId id="413" r:id="rId18"/>
+    <p:sldId id="414" r:id="rId19"/>
+    <p:sldId id="415" r:id="rId20"/>
+    <p:sldId id="416" r:id="rId21"/>
+    <p:sldId id="417" r:id="rId22"/>
+    <p:sldId id="445" r:id="rId23"/>
+    <p:sldId id="418" r:id="rId24"/>
+    <p:sldId id="439" r:id="rId25"/>
+    <p:sldId id="423" r:id="rId26"/>
+    <p:sldId id="424" r:id="rId27"/>
   </p:sldIdLst>
   <p:sldSz cx="12192000" cy="6858000"/>
   <p:notesSz cx="7315200" cy="9601200"/>
@@ -184,7 +187,7 @@
 <file path=ppt/revisionInfo.xml><?xml version="1.0" encoding="utf-8"?>
 <p1510:revInfo xmlns:a="http://schemas.openxmlformats.org/drawingml/2006/main" xmlns:r="http://schemas.openxmlformats.org/officeDocument/2006/relationships" xmlns:p1510="http://schemas.microsoft.com/office/powerpoint/2015/10/main">
   <p1510:revLst>
-    <p1510:client id="{639B37A1-3CEE-4589-A6F5-D075DD626ACB}" v="2" dt="2021-11-02T13:35:32.519"/>
+    <p1510:client id="{4CCD535D-1BE5-42BD-B7D4-B51E36FA5060}" v="1" dt="2022-10-31T13:47:30.453"/>
   </p1510:revLst>
 </p1510:revInfo>
 </file>
@@ -352,6 +355,36 @@
       </pc:sldChg>
     </pc:docChg>
   </pc:docChgLst>
+  <pc:docChgLst>
+    <pc:chgData name="Hewner, Mike" userId="7f3f83dd-6dfb-4127-a87f-c1714bd4fac9" providerId="ADAL" clId="{4CCD535D-1BE5-42BD-B7D4-B51E36FA5060}"/>
+    <pc:docChg chg="addSld modSld">
+      <pc:chgData name="Hewner, Mike" userId="7f3f83dd-6dfb-4127-a87f-c1714bd4fac9" providerId="ADAL" clId="{4CCD535D-1BE5-42BD-B7D4-B51E36FA5060}" dt="2022-10-31T13:47:30.447" v="0"/>
+      <pc:docMkLst>
+        <pc:docMk/>
+      </pc:docMkLst>
+      <pc:sldChg chg="add">
+        <pc:chgData name="Hewner, Mike" userId="7f3f83dd-6dfb-4127-a87f-c1714bd4fac9" providerId="ADAL" clId="{4CCD535D-1BE5-42BD-B7D4-B51E36FA5060}" dt="2022-10-31T13:47:30.447" v="0"/>
+        <pc:sldMkLst>
+          <pc:docMk/>
+          <pc:sldMk cId="3014537070" sldId="450"/>
+        </pc:sldMkLst>
+      </pc:sldChg>
+      <pc:sldChg chg="add">
+        <pc:chgData name="Hewner, Mike" userId="7f3f83dd-6dfb-4127-a87f-c1714bd4fac9" providerId="ADAL" clId="{4CCD535D-1BE5-42BD-B7D4-B51E36FA5060}" dt="2022-10-31T13:47:30.447" v="0"/>
+        <pc:sldMkLst>
+          <pc:docMk/>
+          <pc:sldMk cId="387688988" sldId="451"/>
+        </pc:sldMkLst>
+      </pc:sldChg>
+      <pc:sldChg chg="add">
+        <pc:chgData name="Hewner, Mike" userId="7f3f83dd-6dfb-4127-a87f-c1714bd4fac9" providerId="ADAL" clId="{4CCD535D-1BE5-42BD-B7D4-B51E36FA5060}" dt="2022-10-31T13:47:30.447" v="0"/>
+        <pc:sldMkLst>
+          <pc:docMk/>
+          <pc:sldMk cId="1500992104" sldId="452"/>
+        </pc:sldMkLst>
+      </pc:sldChg>
+    </pc:docChg>
+  </pc:docChgLst>
 </pc:chgInfo>
 </file>
 
@@ -651,7 +684,7 @@
             <a:fld id="{10D10769-02B4-4A39-A509-B85B96050F21}" type="datetimeFigureOut">
               <a:rPr lang="en-US" smtClean="0"/>
               <a:pPr/>
-              <a:t>11/2/2021</a:t>
+              <a:t>10/31/2022</a:t>
             </a:fld>
             <a:endParaRPr lang="en-US"/>
           </a:p>
@@ -1060,7 +1093,10 @@
           <a:bodyPr/>
           <a:lstStyle/>
           <a:p>
-            <a:endParaRPr lang="en-US" dirty="0"/>
+            <a:r>
+              <a:rPr lang="en-US" dirty="0"/>
+              <a:t>Draw the diagram on the board</a:t>
+            </a:r>
           </a:p>
         </p:txBody>
       </p:sp>
@@ -1079,10 +1115,10 @@
           <a:bodyPr/>
           <a:lstStyle/>
           <a:p>
-            <a:fld id="{537B74A1-C2D6-4C45-BED2-ADE1E76F30BC}" type="slidenum">
+            <a:fld id="{76265C54-799C-4F9B-B21B-5E9FC6A82654}" type="slidenum">
               <a:rPr lang="en-US" smtClean="0"/>
               <a:pPr/>
-              <a:t>7</a:t>
+              <a:t>3</a:t>
             </a:fld>
             <a:endParaRPr lang="en-US"/>
           </a:p>
@@ -1091,7 +1127,7 @@
     </p:spTree>
     <p:extLst>
       <p:ext uri="{BB962C8B-B14F-4D97-AF65-F5344CB8AC3E}">
-        <p14:creationId xmlns:p14="http://schemas.microsoft.com/office/powerpoint/2010/main" val="3953141832"/>
+        <p14:creationId xmlns:p14="http://schemas.microsoft.com/office/powerpoint/2010/main" val="3977948186"/>
       </p:ext>
     </p:extLst>
   </p:cSld>
@@ -1161,7 +1197,7 @@
             <a:spLocks noGrp="1"/>
           </p:cNvSpPr>
           <p:nvPr>
-            <p:ph type="sldNum" sz="quarter" idx="10"/>
+            <p:ph type="sldNum" sz="quarter" idx="5"/>
           </p:nvPr>
         </p:nvSpPr>
         <p:spPr/>
@@ -1170,26 +1206,18 @@
           <a:lstStyle/>
           <a:p>
             <a:fld id="{537B74A1-C2D6-4C45-BED2-ADE1E76F30BC}" type="slidenum">
-              <a:rPr lang="en-US" smtClean="0">
-                <a:solidFill>
-                  <a:prstClr val="black"/>
-                </a:solidFill>
-              </a:rPr>
+              <a:rPr lang="en-US" smtClean="0"/>
               <a:pPr/>
-              <a:t>16</a:t>
+              <a:t>10</a:t>
             </a:fld>
-            <a:endParaRPr lang="en-US">
-              <a:solidFill>
-                <a:prstClr val="black"/>
-              </a:solidFill>
-            </a:endParaRPr>
+            <a:endParaRPr lang="en-US"/>
           </a:p>
         </p:txBody>
       </p:sp>
     </p:spTree>
     <p:extLst>
       <p:ext uri="{BB962C8B-B14F-4D97-AF65-F5344CB8AC3E}">
-        <p14:creationId xmlns:p14="http://schemas.microsoft.com/office/powerpoint/2010/main" val="4198611283"/>
+        <p14:creationId xmlns:p14="http://schemas.microsoft.com/office/powerpoint/2010/main" val="3953141832"/>
       </p:ext>
     </p:extLst>
   </p:cSld>
@@ -1248,18 +1276,7 @@
           <a:bodyPr/>
           <a:lstStyle/>
           <a:p>
-            <a:r>
-              <a:rPr lang="en-US" dirty="0"/>
-              <a:t>Solution code is in SVN/304/</a:t>
-            </a:r>
-            <a:r>
-              <a:rPr lang="en-US" dirty="0" err="1"/>
-              <a:t>SchemeSource</a:t>
-            </a:r>
-            <a:r>
-              <a:rPr lang="en-US" dirty="0"/>
-              <a:t>/imperative-form.</a:t>
-            </a:r>
+            <a:endParaRPr lang="en-US" dirty="0"/>
           </a:p>
         </p:txBody>
       </p:sp>
@@ -1270,7 +1287,7 @@
             <a:spLocks noGrp="1"/>
           </p:cNvSpPr>
           <p:nvPr>
-            <p:ph type="sldNum" sz="quarter" idx="5"/>
+            <p:ph type="sldNum" sz="quarter" idx="10"/>
           </p:nvPr>
         </p:nvSpPr>
         <p:spPr/>
@@ -1279,18 +1296,26 @@
           <a:lstStyle/>
           <a:p>
             <a:fld id="{537B74A1-C2D6-4C45-BED2-ADE1E76F30BC}" type="slidenum">
-              <a:rPr lang="en-US" smtClean="0"/>
+              <a:rPr lang="en-US" smtClean="0">
+                <a:solidFill>
+                  <a:prstClr val="black"/>
+                </a:solidFill>
+              </a:rPr>
               <a:pPr/>
               <a:t>19</a:t>
             </a:fld>
-            <a:endParaRPr lang="en-US"/>
+            <a:endParaRPr lang="en-US">
+              <a:solidFill>
+                <a:prstClr val="black"/>
+              </a:solidFill>
+            </a:endParaRPr>
           </a:p>
         </p:txBody>
       </p:sp>
     </p:spTree>
     <p:extLst>
       <p:ext uri="{BB962C8B-B14F-4D97-AF65-F5344CB8AC3E}">
-        <p14:creationId xmlns:p14="http://schemas.microsoft.com/office/powerpoint/2010/main" val="2225893673"/>
+        <p14:creationId xmlns:p14="http://schemas.microsoft.com/office/powerpoint/2010/main" val="4198611283"/>
       </p:ext>
     </p:extLst>
   </p:cSld>
@@ -1327,7 +1352,12 @@
             <p:ph type="sldImg"/>
           </p:nvPr>
         </p:nvSpPr>
-        <p:spPr/>
+        <p:spPr>
+          <a:xfrm>
+            <a:off x="457200" y="720725"/>
+            <a:ext cx="6400800" cy="3600450"/>
+          </a:xfrm>
+        </p:spPr>
       </p:sp>
       <p:sp>
         <p:nvSpPr>
@@ -1344,7 +1374,18 @@
           <a:bodyPr/>
           <a:lstStyle/>
           <a:p>
-            <a:endParaRPr lang="en-US" dirty="0"/>
+            <a:r>
+              <a:rPr lang="en-US" dirty="0"/>
+              <a:t>Solution code is in SVN/304/</a:t>
+            </a:r>
+            <a:r>
+              <a:rPr lang="en-US" dirty="0" err="1"/>
+              <a:t>SchemeSource</a:t>
+            </a:r>
+            <a:r>
+              <a:rPr lang="en-US" dirty="0"/>
+              <a:t>/imperative-form.</a:t>
+            </a:r>
           </a:p>
         </p:txBody>
       </p:sp>
@@ -1366,7 +1407,92 @@
             <a:fld id="{537B74A1-C2D6-4C45-BED2-ADE1E76F30BC}" type="slidenum">
               <a:rPr lang="en-US" smtClean="0"/>
               <a:pPr/>
-              <a:t>23</a:t>
+              <a:t>22</a:t>
+            </a:fld>
+            <a:endParaRPr lang="en-US"/>
+          </a:p>
+        </p:txBody>
+      </p:sp>
+    </p:spTree>
+    <p:extLst>
+      <p:ext uri="{BB962C8B-B14F-4D97-AF65-F5344CB8AC3E}">
+        <p14:creationId xmlns:p14="http://schemas.microsoft.com/office/powerpoint/2010/main" val="2225893673"/>
+      </p:ext>
+    </p:extLst>
+  </p:cSld>
+  <p:clrMapOvr>
+    <a:masterClrMapping/>
+  </p:clrMapOvr>
+</p:notes>
+</file>
+
+<file path=ppt/notesSlides/notesSlide6.xml><?xml version="1.0" encoding="utf-8"?>
+<p:notes xmlns:a="http://schemas.openxmlformats.org/drawingml/2006/main" xmlns:r="http://schemas.openxmlformats.org/officeDocument/2006/relationships" xmlns:p="http://schemas.openxmlformats.org/presentationml/2006/main">
+  <p:cSld>
+    <p:spTree>
+      <p:nvGrpSpPr>
+        <p:cNvPr id="1" name=""/>
+        <p:cNvGrpSpPr/>
+        <p:nvPr/>
+      </p:nvGrpSpPr>
+      <p:grpSpPr>
+        <a:xfrm>
+          <a:off x="0" y="0"/>
+          <a:ext cx="0" cy="0"/>
+          <a:chOff x="0" y="0"/>
+          <a:chExt cx="0" cy="0"/>
+        </a:xfrm>
+      </p:grpSpPr>
+      <p:sp>
+        <p:nvSpPr>
+          <p:cNvPr id="2" name="Slide Image Placeholder 1"/>
+          <p:cNvSpPr>
+            <a:spLocks noGrp="1" noRot="1" noChangeAspect="1"/>
+          </p:cNvSpPr>
+          <p:nvPr>
+            <p:ph type="sldImg"/>
+          </p:nvPr>
+        </p:nvSpPr>
+        <p:spPr/>
+      </p:sp>
+      <p:sp>
+        <p:nvSpPr>
+          <p:cNvPr id="3" name="Notes Placeholder 2"/>
+          <p:cNvSpPr>
+            <a:spLocks noGrp="1"/>
+          </p:cNvSpPr>
+          <p:nvPr>
+            <p:ph type="body" idx="1"/>
+          </p:nvPr>
+        </p:nvSpPr>
+        <p:spPr/>
+        <p:txBody>
+          <a:bodyPr/>
+          <a:lstStyle/>
+          <a:p>
+            <a:endParaRPr lang="en-US" dirty="0"/>
+          </a:p>
+        </p:txBody>
+      </p:sp>
+      <p:sp>
+        <p:nvSpPr>
+          <p:cNvPr id="4" name="Slide Number Placeholder 3"/>
+          <p:cNvSpPr>
+            <a:spLocks noGrp="1"/>
+          </p:cNvSpPr>
+          <p:nvPr>
+            <p:ph type="sldNum" sz="quarter" idx="5"/>
+          </p:nvPr>
+        </p:nvSpPr>
+        <p:spPr/>
+        <p:txBody>
+          <a:bodyPr/>
+          <a:lstStyle/>
+          <a:p>
+            <a:fld id="{537B74A1-C2D6-4C45-BED2-ADE1E76F30BC}" type="slidenum">
+              <a:rPr lang="en-US" smtClean="0"/>
+              <a:pPr/>
+              <a:t>26</a:t>
             </a:fld>
             <a:endParaRPr lang="en-US"/>
           </a:p>
@@ -3652,6 +3778,429 @@
       </p:grpSpPr>
       <p:sp>
         <p:nvSpPr>
+          <p:cNvPr id="43010" name="Rectangle 2"/>
+          <p:cNvSpPr>
+            <a:spLocks noGrp="1" noChangeArrowheads="1"/>
+          </p:cNvSpPr>
+          <p:nvPr>
+            <p:ph type="title"/>
+          </p:nvPr>
+        </p:nvSpPr>
+        <p:spPr/>
+        <p:txBody>
+          <a:bodyPr/>
+          <a:lstStyle/>
+          <a:p>
+            <a:r>
+              <a:rPr lang="en-US" altLang="en-US"/>
+              <a:t>A simple example</a:t>
+            </a:r>
+          </a:p>
+        </p:txBody>
+      </p:sp>
+      <p:sp>
+        <p:nvSpPr>
+          <p:cNvPr id="43011" name="Rectangle 3"/>
+          <p:cNvSpPr>
+            <a:spLocks noGrp="1" noChangeArrowheads="1"/>
+          </p:cNvSpPr>
+          <p:nvPr>
+            <p:ph type="body" idx="1"/>
+          </p:nvPr>
+        </p:nvSpPr>
+        <p:spPr/>
+        <p:txBody>
+          <a:bodyPr/>
+          <a:lstStyle/>
+          <a:p>
+            <a:pPr>
+              <a:spcBef>
+                <a:spcPts val="1800"/>
+              </a:spcBef>
+            </a:pPr>
+            <a:r>
+              <a:rPr lang="en-US" altLang="en-US" dirty="0"/>
+              <a:t>We’re not going to have you write stuff to convert scheme code in an automated way – we’re just going to ask you to do the transformation by hand, as you’ve done for cps</a:t>
+            </a:r>
+          </a:p>
+          <a:p>
+            <a:pPr>
+              <a:spcBef>
+                <a:spcPts val="1800"/>
+              </a:spcBef>
+            </a:pPr>
+            <a:r>
+              <a:rPr lang="en-US" altLang="en-US" dirty="0"/>
+              <a:t>The code in these slides is linked from today’s Resources column in the Schedule Page.</a:t>
+            </a:r>
+          </a:p>
+        </p:txBody>
+      </p:sp>
+    </p:spTree>
+    <p:extLst>
+      <p:ext uri="{BB962C8B-B14F-4D97-AF65-F5344CB8AC3E}">
+        <p14:creationId xmlns:p14="http://schemas.microsoft.com/office/powerpoint/2010/main" val="4159017883"/>
+      </p:ext>
+    </p:extLst>
+  </p:cSld>
+  <p:clrMapOvr>
+    <a:masterClrMapping/>
+  </p:clrMapOvr>
+</p:sld>
+</file>
+
+<file path=ppt/slides/slide11.xml><?xml version="1.0" encoding="utf-8"?>
+<p:sld xmlns:a="http://schemas.openxmlformats.org/drawingml/2006/main" xmlns:r="http://schemas.openxmlformats.org/officeDocument/2006/relationships" xmlns:p="http://schemas.openxmlformats.org/presentationml/2006/main">
+  <p:cSld>
+    <p:spTree>
+      <p:nvGrpSpPr>
+        <p:cNvPr id="1" name=""/>
+        <p:cNvGrpSpPr/>
+        <p:nvPr/>
+      </p:nvGrpSpPr>
+      <p:grpSpPr>
+        <a:xfrm>
+          <a:off x="0" y="0"/>
+          <a:ext cx="0" cy="0"/>
+          <a:chOff x="0" y="0"/>
+          <a:chExt cx="0" cy="0"/>
+        </a:xfrm>
+      </p:grpSpPr>
+      <p:pic>
+        <p:nvPicPr>
+          <p:cNvPr id="3" name="Picture 2"/>
+          <p:cNvPicPr>
+            <a:picLocks noChangeAspect="1"/>
+          </p:cNvPicPr>
+          <p:nvPr/>
+        </p:nvPicPr>
+        <p:blipFill>
+          <a:blip r:embed="rId2"/>
+          <a:stretch>
+            <a:fillRect/>
+          </a:stretch>
+        </p:blipFill>
+        <p:spPr>
+          <a:xfrm>
+            <a:off x="2362200" y="635952"/>
+            <a:ext cx="7995624" cy="5002848"/>
+          </a:xfrm>
+          <a:prstGeom prst="rect">
+            <a:avLst/>
+          </a:prstGeom>
+        </p:spPr>
+      </p:pic>
+      <p:sp>
+        <p:nvSpPr>
+          <p:cNvPr id="44034" name="Rectangle 2"/>
+          <p:cNvSpPr>
+            <a:spLocks noGrp="1" noChangeArrowheads="1"/>
+          </p:cNvSpPr>
+          <p:nvPr>
+            <p:ph type="title"/>
+          </p:nvPr>
+        </p:nvSpPr>
+        <p:spPr>
+          <a:xfrm>
+            <a:off x="2895600" y="-76200"/>
+            <a:ext cx="7086600" cy="609600"/>
+          </a:xfrm>
+        </p:spPr>
+        <p:txBody>
+          <a:bodyPr/>
+          <a:lstStyle/>
+          <a:p>
+            <a:r>
+              <a:rPr lang="en-US" altLang="en-US" sz="3200" dirty="0"/>
+              <a:t>A simple example</a:t>
+            </a:r>
+          </a:p>
+        </p:txBody>
+      </p:sp>
+      <p:sp>
+        <p:nvSpPr>
+          <p:cNvPr id="44037" name="Text Box 5"/>
+          <p:cNvSpPr txBox="1">
+            <a:spLocks noChangeArrowheads="1"/>
+          </p:cNvSpPr>
+          <p:nvPr/>
+        </p:nvSpPr>
+        <p:spPr bwMode="auto">
+          <a:xfrm>
+            <a:off x="5105400" y="1828800"/>
+            <a:ext cx="4876800" cy="641350"/>
+          </a:xfrm>
+          <a:prstGeom prst="rect">
+            <a:avLst/>
+          </a:prstGeom>
+          <a:solidFill>
+            <a:schemeClr val="accent3">
+              <a:lumMod val="95000"/>
+            </a:schemeClr>
+          </a:solidFill>
+          <a:ln>
+            <a:noFill/>
+          </a:ln>
+          <a:effectLst/>
+        </p:spPr>
+        <p:txBody>
+          <a:bodyPr>
+            <a:spAutoFit/>
+          </a:bodyPr>
+          <a:lstStyle/>
+          <a:p>
+            <a:pPr>
+              <a:spcBef>
+                <a:spcPct val="50000"/>
+              </a:spcBef>
+            </a:pPr>
+            <a:r>
+              <a:rPr lang="en-US" altLang="en-US" sz="3600" b="1" dirty="0">
+                <a:solidFill>
+                  <a:srgbClr val="990099"/>
+                </a:solidFill>
+              </a:rPr>
+              <a:t>Next: convert to CPS</a:t>
+            </a:r>
+          </a:p>
+        </p:txBody>
+      </p:sp>
+      <p:pic>
+        <p:nvPicPr>
+          <p:cNvPr id="4" name="Picture 3"/>
+          <p:cNvPicPr>
+            <a:picLocks noChangeAspect="1"/>
+          </p:cNvPicPr>
+          <p:nvPr/>
+        </p:nvPicPr>
+        <p:blipFill>
+          <a:blip r:embed="rId3"/>
+          <a:stretch>
+            <a:fillRect/>
+          </a:stretch>
+        </p:blipFill>
+        <p:spPr>
+          <a:xfrm>
+            <a:off x="2399372" y="5867401"/>
+            <a:ext cx="5830229" cy="748837"/>
+          </a:xfrm>
+          <a:prstGeom prst="rect">
+            <a:avLst/>
+          </a:prstGeom>
+        </p:spPr>
+      </p:pic>
+    </p:spTree>
+    <p:extLst>
+      <p:ext uri="{BB962C8B-B14F-4D97-AF65-F5344CB8AC3E}">
+        <p14:creationId xmlns:p14="http://schemas.microsoft.com/office/powerpoint/2010/main" val="205647370"/>
+      </p:ext>
+    </p:extLst>
+  </p:cSld>
+  <p:clrMapOvr>
+    <a:masterClrMapping/>
+  </p:clrMapOvr>
+  <p:timing>
+    <p:tnLst>
+      <p:par>
+        <p:cTn id="1" dur="indefinite" restart="never" nodeType="tmRoot">
+          <p:childTnLst>
+            <p:seq concurrent="1" nextAc="seek">
+              <p:cTn id="2" dur="indefinite" nodeType="mainSeq">
+                <p:childTnLst>
+                  <p:par>
+                    <p:cTn id="3" fill="hold" nodeType="clickPar">
+                      <p:stCondLst>
+                        <p:cond delay="indefinite"/>
+                      </p:stCondLst>
+                      <p:childTnLst>
+                        <p:par>
+                          <p:cTn id="4" fill="hold" nodeType="withGroup">
+                            <p:stCondLst>
+                              <p:cond delay="0"/>
+                            </p:stCondLst>
+                            <p:childTnLst>
+                              <p:par>
+                                <p:cTn id="5" presetID="9" presetClass="entr" presetSubtype="0" fill="hold" grpId="0" nodeType="clickEffect">
+                                  <p:stCondLst>
+                                    <p:cond delay="0"/>
+                                  </p:stCondLst>
+                                  <p:childTnLst>
+                                    <p:set>
+                                      <p:cBhvr>
+                                        <p:cTn id="6" dur="1" fill="hold">
+                                          <p:stCondLst>
+                                            <p:cond delay="0"/>
+                                          </p:stCondLst>
+                                        </p:cTn>
+                                        <p:tgtEl>
+                                          <p:spTgt spid="44037"/>
+                                        </p:tgtEl>
+                                        <p:attrNameLst>
+                                          <p:attrName>style.visibility</p:attrName>
+                                        </p:attrNameLst>
+                                      </p:cBhvr>
+                                      <p:to>
+                                        <p:strVal val="visible"/>
+                                      </p:to>
+                                    </p:set>
+                                    <p:animEffect transition="in" filter="dissolve">
+                                      <p:cBhvr>
+                                        <p:cTn id="7" dur="500"/>
+                                        <p:tgtEl>
+                                          <p:spTgt spid="44037"/>
+                                        </p:tgtEl>
+                                      </p:cBhvr>
+                                    </p:animEffect>
+                                  </p:childTnLst>
+                                </p:cTn>
+                              </p:par>
+                            </p:childTnLst>
+                          </p:cTn>
+                        </p:par>
+                      </p:childTnLst>
+                    </p:cTn>
+                  </p:par>
+                </p:childTnLst>
+              </p:cTn>
+              <p:prevCondLst>
+                <p:cond evt="onPrev" delay="0">
+                  <p:tgtEl>
+                    <p:sldTgt/>
+                  </p:tgtEl>
+                </p:cond>
+              </p:prevCondLst>
+              <p:nextCondLst>
+                <p:cond evt="onNext" delay="0">
+                  <p:tgtEl>
+                    <p:sldTgt/>
+                  </p:tgtEl>
+                </p:cond>
+              </p:nextCondLst>
+            </p:seq>
+          </p:childTnLst>
+        </p:cTn>
+      </p:par>
+    </p:tnLst>
+    <p:bldLst>
+      <p:bldP spid="44037" grpId="0" animBg="1"/>
+    </p:bldLst>
+  </p:timing>
+</p:sld>
+</file>
+
+<file path=ppt/slides/slide12.xml><?xml version="1.0" encoding="utf-8"?>
+<p:sld xmlns:a="http://schemas.openxmlformats.org/drawingml/2006/main" xmlns:r="http://schemas.openxmlformats.org/officeDocument/2006/relationships" xmlns:p="http://schemas.openxmlformats.org/presentationml/2006/main">
+  <p:cSld>
+    <p:spTree>
+      <p:nvGrpSpPr>
+        <p:cNvPr id="1" name=""/>
+        <p:cNvGrpSpPr/>
+        <p:nvPr/>
+      </p:nvGrpSpPr>
+      <p:grpSpPr>
+        <a:xfrm>
+          <a:off x="0" y="0"/>
+          <a:ext cx="0" cy="0"/>
+          <a:chOff x="0" y="0"/>
+          <a:chExt cx="0" cy="0"/>
+        </a:xfrm>
+      </p:grpSpPr>
+      <p:sp>
+        <p:nvSpPr>
+          <p:cNvPr id="46082" name="Rectangle 2"/>
+          <p:cNvSpPr>
+            <a:spLocks noGrp="1" noChangeArrowheads="1"/>
+          </p:cNvSpPr>
+          <p:nvPr>
+            <p:ph type="title"/>
+          </p:nvPr>
+        </p:nvSpPr>
+        <p:spPr>
+          <a:xfrm>
+            <a:off x="1981200" y="-152400"/>
+            <a:ext cx="8229600" cy="1143000"/>
+          </a:xfrm>
+        </p:spPr>
+        <p:txBody>
+          <a:bodyPr/>
+          <a:lstStyle/>
+          <a:p>
+            <a:r>
+              <a:rPr lang="en-US" altLang="en-US" sz="3200" dirty="0"/>
+              <a:t>Convert to CPS form – part 1</a:t>
+            </a:r>
+            <a:br>
+              <a:rPr lang="en-US" altLang="en-US" sz="3200" dirty="0"/>
+            </a:br>
+            <a:r>
+              <a:rPr lang="en-US" altLang="en-US" sz="2400" dirty="0"/>
+              <a:t>Represent continuations as Scheme procedures</a:t>
+            </a:r>
+          </a:p>
+        </p:txBody>
+      </p:sp>
+      <p:pic>
+        <p:nvPicPr>
+          <p:cNvPr id="2" name="Picture 1">
+            <a:extLst>
+              <a:ext uri="{FF2B5EF4-FFF2-40B4-BE49-F238E27FC236}">
+                <a16:creationId xmlns:a16="http://schemas.microsoft.com/office/drawing/2014/main" id="{199C4AA1-7370-465E-920A-BCF431B9DC15}"/>
+              </a:ext>
+            </a:extLst>
+          </p:cNvPr>
+          <p:cNvPicPr>
+            <a:picLocks noChangeAspect="1"/>
+          </p:cNvPicPr>
+          <p:nvPr/>
+        </p:nvPicPr>
+        <p:blipFill>
+          <a:blip r:embed="rId2"/>
+          <a:stretch>
+            <a:fillRect/>
+          </a:stretch>
+        </p:blipFill>
+        <p:spPr>
+          <a:xfrm>
+            <a:off x="1676400" y="963769"/>
+            <a:ext cx="8839200" cy="6055387"/>
+          </a:xfrm>
+          <a:prstGeom prst="rect">
+            <a:avLst/>
+          </a:prstGeom>
+        </p:spPr>
+      </p:pic>
+    </p:spTree>
+    <p:extLst>
+      <p:ext uri="{BB962C8B-B14F-4D97-AF65-F5344CB8AC3E}">
+        <p14:creationId xmlns:p14="http://schemas.microsoft.com/office/powerpoint/2010/main" val="770179527"/>
+      </p:ext>
+    </p:extLst>
+  </p:cSld>
+  <p:clrMapOvr>
+    <a:masterClrMapping/>
+  </p:clrMapOvr>
+</p:sld>
+</file>
+
+<file path=ppt/slides/slide13.xml><?xml version="1.0" encoding="utf-8"?>
+<p:sld xmlns:a="http://schemas.openxmlformats.org/drawingml/2006/main" xmlns:r="http://schemas.openxmlformats.org/officeDocument/2006/relationships" xmlns:p="http://schemas.openxmlformats.org/presentationml/2006/main">
+  <p:cSld>
+    <p:spTree>
+      <p:nvGrpSpPr>
+        <p:cNvPr id="1" name=""/>
+        <p:cNvGrpSpPr/>
+        <p:nvPr/>
+      </p:nvGrpSpPr>
+      <p:grpSpPr>
+        <a:xfrm>
+          <a:off x="0" y="0"/>
+          <a:ext cx="0" cy="0"/>
+          <a:chOff x="0" y="0"/>
+          <a:chExt cx="0" cy="0"/>
+        </a:xfrm>
+      </p:grpSpPr>
+      <p:sp>
+        <p:nvSpPr>
           <p:cNvPr id="49154" name="Rectangle 2"/>
           <p:cNvSpPr>
             <a:spLocks noGrp="1" noChangeArrowheads="1"/>
@@ -3757,7 +4306,7 @@
 </p:sld>
 </file>
 
-<file path=ppt/slides/slide11.xml><?xml version="1.0" encoding="utf-8"?>
+<file path=ppt/slides/slide14.xml><?xml version="1.0" encoding="utf-8"?>
 <p:sld xmlns:a="http://schemas.openxmlformats.org/drawingml/2006/main" xmlns:r="http://schemas.openxmlformats.org/officeDocument/2006/relationships" xmlns:p="http://schemas.openxmlformats.org/presentationml/2006/main">
   <p:cSld>
     <p:spTree>
@@ -4402,7 +4951,7 @@
 </p:sld>
 </file>
 
-<file path=ppt/slides/slide12.xml><?xml version="1.0" encoding="utf-8"?>
+<file path=ppt/slides/slide15.xml><?xml version="1.0" encoding="utf-8"?>
 <p:sld xmlns:a="http://schemas.openxmlformats.org/drawingml/2006/main" xmlns:r="http://schemas.openxmlformats.org/officeDocument/2006/relationships" xmlns:p="http://schemas.openxmlformats.org/presentationml/2006/main">
   <p:cSld>
     <p:spTree>
@@ -5721,7 +6270,7 @@
 </p:sld>
 </file>
 
-<file path=ppt/slides/slide13.xml><?xml version="1.0" encoding="utf-8"?>
+<file path=ppt/slides/slide16.xml><?xml version="1.0" encoding="utf-8"?>
 <p:sld xmlns:a="http://schemas.openxmlformats.org/drawingml/2006/main" xmlns:r="http://schemas.openxmlformats.org/officeDocument/2006/relationships" xmlns:p="http://schemas.openxmlformats.org/presentationml/2006/main">
   <p:cSld>
     <p:spTree>
@@ -5815,7 +6364,7 @@
 </p:sld>
 </file>
 
-<file path=ppt/slides/slide14.xml><?xml version="1.0" encoding="utf-8"?>
+<file path=ppt/slides/slide17.xml><?xml version="1.0" encoding="utf-8"?>
 <p:sld xmlns:a="http://schemas.openxmlformats.org/drawingml/2006/main" xmlns:r="http://schemas.openxmlformats.org/officeDocument/2006/relationships" xmlns:p="http://schemas.openxmlformats.org/presentationml/2006/main">
   <p:cSld>
     <p:spTree>
@@ -5939,7 +6488,7 @@
 </p:sld>
 </file>
 
-<file path=ppt/slides/slide15.xml><?xml version="1.0" encoding="utf-8"?>
+<file path=ppt/slides/slide18.xml><?xml version="1.0" encoding="utf-8"?>
 <p:sld xmlns:a="http://schemas.openxmlformats.org/drawingml/2006/main" xmlns:r="http://schemas.openxmlformats.org/officeDocument/2006/relationships" xmlns:p="http://schemas.openxmlformats.org/presentationml/2006/main">
   <p:cSld>
     <p:spTree>
@@ -6026,7 +6575,7 @@
 </p:sld>
 </file>
 
-<file path=ppt/slides/slide16.xml><?xml version="1.0" encoding="utf-8"?>
+<file path=ppt/slides/slide19.xml><?xml version="1.0" encoding="utf-8"?>
 <p:sld xmlns:a="http://schemas.openxmlformats.org/drawingml/2006/main" xmlns:r="http://schemas.openxmlformats.org/officeDocument/2006/relationships" xmlns:p="http://schemas.openxmlformats.org/presentationml/2006/main">
   <p:cSld>
     <p:spTree>
@@ -6113,370 +6662,6 @@
 </p:sld>
 </file>
 
-<file path=ppt/slides/slide17.xml><?xml version="1.0" encoding="utf-8"?>
-<p:sld xmlns:a="http://schemas.openxmlformats.org/drawingml/2006/main" xmlns:r="http://schemas.openxmlformats.org/officeDocument/2006/relationships" xmlns:p="http://schemas.openxmlformats.org/presentationml/2006/main">
-  <p:cSld>
-    <p:spTree>
-      <p:nvGrpSpPr>
-        <p:cNvPr id="1" name=""/>
-        <p:cNvGrpSpPr/>
-        <p:nvPr/>
-      </p:nvGrpSpPr>
-      <p:grpSpPr>
-        <a:xfrm>
-          <a:off x="0" y="0"/>
-          <a:ext cx="0" cy="0"/>
-          <a:chOff x="0" y="0"/>
-          <a:chExt cx="0" cy="0"/>
-        </a:xfrm>
-      </p:grpSpPr>
-      <p:sp>
-        <p:nvSpPr>
-          <p:cNvPr id="63490" name="Rectangle 2"/>
-          <p:cNvSpPr>
-            <a:spLocks noGrp="1" noChangeArrowheads="1"/>
-          </p:cNvSpPr>
-          <p:nvPr>
-            <p:ph type="title"/>
-          </p:nvPr>
-        </p:nvSpPr>
-        <p:spPr/>
-        <p:txBody>
-          <a:bodyPr/>
-          <a:lstStyle/>
-          <a:p>
-            <a:r>
-              <a:rPr lang="en-US" altLang="en-US"/>
-              <a:t>What do we have now?</a:t>
-            </a:r>
-          </a:p>
-        </p:txBody>
-      </p:sp>
-      <p:sp>
-        <p:nvSpPr>
-          <p:cNvPr id="63491" name="Rectangle 3"/>
-          <p:cNvSpPr>
-            <a:spLocks noGrp="1" noChangeArrowheads="1"/>
-          </p:cNvSpPr>
-          <p:nvPr>
-            <p:ph type="body" idx="1"/>
-          </p:nvPr>
-        </p:nvSpPr>
-        <p:spPr/>
-        <p:txBody>
-          <a:bodyPr/>
-          <a:lstStyle/>
-          <a:p>
-            <a:pPr>
-              <a:lnSpc>
-                <a:spcPct val="90000"/>
-              </a:lnSpc>
-            </a:pPr>
-            <a:r>
-              <a:rPr lang="en-US" altLang="en-US" dirty="0"/>
-              <a:t>Using this style, we could write the interpreter in any language that provides a means of creating records.</a:t>
-            </a:r>
-          </a:p>
-          <a:p>
-            <a:pPr>
-              <a:lnSpc>
-                <a:spcPct val="90000"/>
-              </a:lnSpc>
-              <a:spcBef>
-                <a:spcPts val="2400"/>
-              </a:spcBef>
-            </a:pPr>
-            <a:r>
-              <a:rPr lang="en-US" altLang="en-US" dirty="0"/>
-              <a:t>But it would be inefficient if that language's compiler does not handle tail-recursion properly </a:t>
-            </a:r>
-          </a:p>
-          <a:p>
-            <a:pPr lvl="1">
-              <a:lnSpc>
-                <a:spcPct val="90000"/>
-              </a:lnSpc>
-              <a:spcBef>
-                <a:spcPts val="1200"/>
-              </a:spcBef>
-            </a:pPr>
-            <a:r>
-              <a:rPr lang="en-US" altLang="en-US" dirty="0"/>
-              <a:t>Could even result in a stack overflow.</a:t>
-            </a:r>
-          </a:p>
-          <a:p>
-            <a:pPr>
-              <a:lnSpc>
-                <a:spcPct val="90000"/>
-              </a:lnSpc>
-              <a:spcBef>
-                <a:spcPts val="2400"/>
-              </a:spcBef>
-            </a:pPr>
-            <a:r>
-              <a:rPr lang="en-US" altLang="en-US" dirty="0"/>
-              <a:t>So we transform to a style in which the flow of control is really just assignments, BEGINs, IFs,  and GOTOs:</a:t>
-            </a:r>
-          </a:p>
-        </p:txBody>
-      </p:sp>
-    </p:spTree>
-    <p:extLst>
-      <p:ext uri="{BB962C8B-B14F-4D97-AF65-F5344CB8AC3E}">
-        <p14:creationId xmlns:p14="http://schemas.microsoft.com/office/powerpoint/2010/main" val="4046433412"/>
-      </p:ext>
-    </p:extLst>
-  </p:cSld>
-  <p:clrMapOvr>
-    <a:masterClrMapping/>
-  </p:clrMapOvr>
-</p:sld>
-</file>
-
-<file path=ppt/slides/slide18.xml><?xml version="1.0" encoding="utf-8"?>
-<p:sld xmlns:a="http://schemas.openxmlformats.org/drawingml/2006/main" xmlns:r="http://schemas.openxmlformats.org/officeDocument/2006/relationships" xmlns:p="http://schemas.openxmlformats.org/presentationml/2006/main">
-  <p:cSld>
-    <p:spTree>
-      <p:nvGrpSpPr>
-        <p:cNvPr id="1" name=""/>
-        <p:cNvGrpSpPr/>
-        <p:nvPr/>
-      </p:nvGrpSpPr>
-      <p:grpSpPr>
-        <a:xfrm>
-          <a:off x="0" y="0"/>
-          <a:ext cx="0" cy="0"/>
-          <a:chOff x="0" y="0"/>
-          <a:chExt cx="0" cy="0"/>
-        </a:xfrm>
-      </p:grpSpPr>
-      <p:sp>
-        <p:nvSpPr>
-          <p:cNvPr id="59394" name="Rectangle 2"/>
-          <p:cNvSpPr>
-            <a:spLocks noGrp="1" noChangeArrowheads="1"/>
-          </p:cNvSpPr>
-          <p:nvPr>
-            <p:ph type="title"/>
-          </p:nvPr>
-        </p:nvSpPr>
-        <p:spPr>
-          <a:xfrm>
-            <a:off x="1981200" y="0"/>
-            <a:ext cx="8229600" cy="1143000"/>
-          </a:xfrm>
-        </p:spPr>
-        <p:txBody>
-          <a:bodyPr/>
-          <a:lstStyle/>
-          <a:p>
-            <a:r>
-              <a:rPr lang="en-US" altLang="en-US" dirty="0"/>
-              <a:t>Transform to Imperative form</a:t>
-            </a:r>
-          </a:p>
-        </p:txBody>
-      </p:sp>
-      <p:sp>
-        <p:nvSpPr>
-          <p:cNvPr id="59395" name="Rectangle 3"/>
-          <p:cNvSpPr>
-            <a:spLocks noGrp="1" noChangeArrowheads="1"/>
-          </p:cNvSpPr>
-          <p:nvPr>
-            <p:ph type="body" idx="1"/>
-          </p:nvPr>
-        </p:nvSpPr>
-        <p:spPr>
-          <a:xfrm>
-            <a:off x="609600" y="1143000"/>
-            <a:ext cx="11506200" cy="4876800"/>
-          </a:xfrm>
-        </p:spPr>
-        <p:txBody>
-          <a:bodyPr/>
-          <a:lstStyle/>
-          <a:p>
-            <a:pPr>
-              <a:spcBef>
-                <a:spcPts val="2400"/>
-              </a:spcBef>
-            </a:pPr>
-            <a:r>
-              <a:rPr lang="en-US" altLang="en-US" dirty="0"/>
-              <a:t>All substantial procedures will be called in tail-position, so they do not need to return. </a:t>
-            </a:r>
-          </a:p>
-          <a:p>
-            <a:pPr>
-              <a:spcBef>
-                <a:spcPts val="2400"/>
-              </a:spcBef>
-            </a:pPr>
-            <a:r>
-              <a:rPr lang="en-US" altLang="en-US" dirty="0"/>
-              <a:t>All substantial procedures will be thunks (procedures that take  no arguments), thus there is no need to have stack frames that hold parameters.  </a:t>
-            </a:r>
-          </a:p>
-          <a:p>
-            <a:pPr>
-              <a:spcBef>
-                <a:spcPts val="2400"/>
-              </a:spcBef>
-            </a:pPr>
-            <a:r>
-              <a:rPr lang="en-US" altLang="en-US" dirty="0"/>
-              <a:t>Thus each substantial procedure call is equivalent to a "</a:t>
-            </a:r>
-            <a:r>
-              <a:rPr lang="en-US" altLang="en-US" dirty="0" err="1"/>
-              <a:t>goto</a:t>
-            </a:r>
-            <a:r>
-              <a:rPr lang="en-US" altLang="en-US" dirty="0"/>
-              <a:t>"</a:t>
-            </a:r>
-          </a:p>
-          <a:p>
-            <a:pPr>
-              <a:spcBef>
-                <a:spcPts val="2400"/>
-              </a:spcBef>
-            </a:pPr>
-            <a:r>
-              <a:rPr lang="en-US" altLang="en-US" dirty="0"/>
-              <a:t>This can be implemented in almost any language.</a:t>
-            </a:r>
-          </a:p>
-        </p:txBody>
-      </p:sp>
-    </p:spTree>
-    <p:extLst>
-      <p:ext uri="{BB962C8B-B14F-4D97-AF65-F5344CB8AC3E}">
-        <p14:creationId xmlns:p14="http://schemas.microsoft.com/office/powerpoint/2010/main" val="2776800077"/>
-      </p:ext>
-    </p:extLst>
-  </p:cSld>
-  <p:clrMapOvr>
-    <a:masterClrMapping/>
-  </p:clrMapOvr>
-</p:sld>
-</file>
-
-<file path=ppt/slides/slide19.xml><?xml version="1.0" encoding="utf-8"?>
-<p:sld xmlns:a="http://schemas.openxmlformats.org/drawingml/2006/main" xmlns:r="http://schemas.openxmlformats.org/officeDocument/2006/relationships" xmlns:p="http://schemas.openxmlformats.org/presentationml/2006/main">
-  <p:cSld>
-    <p:spTree>
-      <p:nvGrpSpPr>
-        <p:cNvPr id="1" name=""/>
-        <p:cNvGrpSpPr/>
-        <p:nvPr/>
-      </p:nvGrpSpPr>
-      <p:grpSpPr>
-        <a:xfrm>
-          <a:off x="0" y="0"/>
-          <a:ext cx="0" cy="0"/>
-          <a:chOff x="0" y="0"/>
-          <a:chExt cx="0" cy="0"/>
-        </a:xfrm>
-      </p:grpSpPr>
-      <p:sp>
-        <p:nvSpPr>
-          <p:cNvPr id="2" name="Title 1">
-            <a:extLst>
-              <a:ext uri="{FF2B5EF4-FFF2-40B4-BE49-F238E27FC236}">
-                <a16:creationId xmlns:a16="http://schemas.microsoft.com/office/drawing/2014/main" id="{2C9BFF5E-EE3A-4EB6-9181-CC87C1BD1AB8}"/>
-              </a:ext>
-            </a:extLst>
-          </p:cNvPr>
-          <p:cNvSpPr>
-            <a:spLocks noGrp="1"/>
-          </p:cNvSpPr>
-          <p:nvPr>
-            <p:ph type="title"/>
-          </p:nvPr>
-        </p:nvSpPr>
-        <p:spPr/>
-        <p:txBody>
-          <a:bodyPr/>
-          <a:lstStyle/>
-          <a:p>
-            <a:r>
-              <a:rPr lang="en-US" dirty="0"/>
-              <a:t>Transform to imperative form</a:t>
-            </a:r>
-          </a:p>
-        </p:txBody>
-      </p:sp>
-      <p:sp>
-        <p:nvSpPr>
-          <p:cNvPr id="3" name="Content Placeholder 2">
-            <a:extLst>
-              <a:ext uri="{FF2B5EF4-FFF2-40B4-BE49-F238E27FC236}">
-                <a16:creationId xmlns:a16="http://schemas.microsoft.com/office/drawing/2014/main" id="{C51F9E19-203E-4307-8A85-14C4601884E4}"/>
-              </a:ext>
-            </a:extLst>
-          </p:cNvPr>
-          <p:cNvSpPr>
-            <a:spLocks noGrp="1"/>
-          </p:cNvSpPr>
-          <p:nvPr>
-            <p:ph idx="1"/>
-          </p:nvPr>
-        </p:nvSpPr>
-        <p:spPr/>
-        <p:txBody>
-          <a:bodyPr/>
-          <a:lstStyle/>
-          <a:p>
-            <a:pPr>
-              <a:spcBef>
-                <a:spcPts val="2400"/>
-              </a:spcBef>
-            </a:pPr>
-            <a:r>
-              <a:rPr lang="en-US" dirty="0"/>
-              <a:t>Get the code for your section from Live-in-class.</a:t>
-            </a:r>
-          </a:p>
-          <a:p>
-            <a:pPr>
-              <a:spcBef>
-                <a:spcPts val="2400"/>
-              </a:spcBef>
-            </a:pPr>
-            <a:r>
-              <a:rPr lang="en-US" dirty="0"/>
-              <a:t>Transform to imperative form.</a:t>
-            </a:r>
-          </a:p>
-          <a:p>
-            <a:pPr>
-              <a:spcBef>
-                <a:spcPts val="2400"/>
-              </a:spcBef>
-            </a:pPr>
-            <a:r>
-              <a:rPr lang="en-US" dirty="0"/>
-              <a:t>Be sure to look at the tracing mechanism.</a:t>
-            </a:r>
-          </a:p>
-        </p:txBody>
-      </p:sp>
-    </p:spTree>
-    <p:extLst>
-      <p:ext uri="{BB962C8B-B14F-4D97-AF65-F5344CB8AC3E}">
-        <p14:creationId xmlns:p14="http://schemas.microsoft.com/office/powerpoint/2010/main" val="390430155"/>
-      </p:ext>
-    </p:extLst>
-  </p:cSld>
-  <p:clrMapOvr>
-    <a:masterClrMapping/>
-  </p:clrMapOvr>
-</p:sld>
-</file>
-
 <file path=ppt/slides/slide2.xml><?xml version="1.0" encoding="utf-8"?>
 <p:sld xmlns:a="http://schemas.openxmlformats.org/drawingml/2006/main" xmlns:r="http://schemas.openxmlformats.org/officeDocument/2006/relationships" xmlns:p="http://schemas.openxmlformats.org/presentationml/2006/main">
   <p:cSld>
@@ -6496,10 +6681,10 @@
       </p:grpSpPr>
       <p:sp>
         <p:nvSpPr>
-          <p:cNvPr id="4" name="Title 3">
+          <p:cNvPr id="2" name="Title 1">
             <a:extLst>
               <a:ext uri="{FF2B5EF4-FFF2-40B4-BE49-F238E27FC236}">
-                <a16:creationId xmlns:a16="http://schemas.microsoft.com/office/drawing/2014/main" id="{BFB9A05F-2F98-4FB5-8021-513117EAD280}"/>
+                <a16:creationId xmlns:a16="http://schemas.microsoft.com/office/drawing/2014/main" id="{E39C180B-8782-4028-9DF9-7A67CDC0B0F9}"/>
               </a:ext>
             </a:extLst>
           </p:cNvPr>
@@ -6507,7 +6692,7 @@
             <a:spLocks noGrp="1"/>
           </p:cNvSpPr>
           <p:nvPr>
-            <p:ph type="ctrTitle"/>
+            <p:ph type="title"/>
           </p:nvPr>
         </p:nvSpPr>
         <p:spPr/>
@@ -6517,17 +6702,17 @@
           <a:p>
             <a:r>
               <a:rPr lang="en-US" dirty="0"/>
-              <a:t>Imperative form</a:t>
+              <a:t>Implementing Reference parameters</a:t>
             </a:r>
           </a:p>
         </p:txBody>
       </p:sp>
       <p:sp>
         <p:nvSpPr>
-          <p:cNvPr id="5" name="Subtitle 4">
+          <p:cNvPr id="3" name="Text Placeholder 2">
             <a:extLst>
               <a:ext uri="{FF2B5EF4-FFF2-40B4-BE49-F238E27FC236}">
-                <a16:creationId xmlns:a16="http://schemas.microsoft.com/office/drawing/2014/main" id="{5557FABE-AE4D-45A3-A896-99E5BC80D3DC}"/>
+                <a16:creationId xmlns:a16="http://schemas.microsoft.com/office/drawing/2014/main" id="{A8C68B11-491F-41D4-BA61-3791853199C3}"/>
               </a:ext>
             </a:extLst>
           </p:cNvPr>
@@ -6535,17 +6720,32 @@
             <a:spLocks noGrp="1"/>
           </p:cNvSpPr>
           <p:nvPr>
-            <p:ph type="subTitle" idx="1"/>
+            <p:ph type="body" idx="1"/>
           </p:nvPr>
         </p:nvSpPr>
-        <p:spPr/>
+        <p:spPr>
+          <a:xfrm>
+            <a:off x="2838452" y="1943101"/>
+            <a:ext cx="4887515" cy="1125140"/>
+          </a:xfrm>
+        </p:spPr>
         <p:txBody>
           <a:bodyPr/>
           <a:lstStyle/>
           <a:p>
             <a:r>
-              <a:rPr lang="en-US" dirty="0"/>
-              <a:t>As close to C or Assembly Language as we can get in Scheme</a:t>
+              <a:rPr lang="en-US" sz="2100" dirty="0"/>
+              <a:t>For definiteness, I use an “each value in an environment is in a cell” approach.</a:t>
+            </a:r>
+            <a:br>
+              <a:rPr lang="en-US" sz="2100" dirty="0"/>
+            </a:br>
+            <a:br>
+              <a:rPr lang="en-US" sz="2100" dirty="0"/>
+            </a:br>
+            <a:r>
+              <a:rPr lang="en-US" sz="2100" dirty="0"/>
+              <a:t>This should be easily adaptable to the “vector of values” or ”list of values” approaches to references.</a:t>
             </a:r>
           </a:p>
         </p:txBody>
@@ -6553,7 +6753,7 @@
     </p:spTree>
     <p:extLst>
       <p:ext uri="{BB962C8B-B14F-4D97-AF65-F5344CB8AC3E}">
-        <p14:creationId xmlns:p14="http://schemas.microsoft.com/office/powerpoint/2010/main" val="3067851117"/>
+        <p14:creationId xmlns:p14="http://schemas.microsoft.com/office/powerpoint/2010/main" val="3014537070"/>
       </p:ext>
     </p:extLst>
   </p:cSld>
@@ -6564,6 +6764,370 @@
 </file>
 
 <file path=ppt/slides/slide20.xml><?xml version="1.0" encoding="utf-8"?>
+<p:sld xmlns:a="http://schemas.openxmlformats.org/drawingml/2006/main" xmlns:r="http://schemas.openxmlformats.org/officeDocument/2006/relationships" xmlns:p="http://schemas.openxmlformats.org/presentationml/2006/main">
+  <p:cSld>
+    <p:spTree>
+      <p:nvGrpSpPr>
+        <p:cNvPr id="1" name=""/>
+        <p:cNvGrpSpPr/>
+        <p:nvPr/>
+      </p:nvGrpSpPr>
+      <p:grpSpPr>
+        <a:xfrm>
+          <a:off x="0" y="0"/>
+          <a:ext cx="0" cy="0"/>
+          <a:chOff x="0" y="0"/>
+          <a:chExt cx="0" cy="0"/>
+        </a:xfrm>
+      </p:grpSpPr>
+      <p:sp>
+        <p:nvSpPr>
+          <p:cNvPr id="63490" name="Rectangle 2"/>
+          <p:cNvSpPr>
+            <a:spLocks noGrp="1" noChangeArrowheads="1"/>
+          </p:cNvSpPr>
+          <p:nvPr>
+            <p:ph type="title"/>
+          </p:nvPr>
+        </p:nvSpPr>
+        <p:spPr/>
+        <p:txBody>
+          <a:bodyPr/>
+          <a:lstStyle/>
+          <a:p>
+            <a:r>
+              <a:rPr lang="en-US" altLang="en-US"/>
+              <a:t>What do we have now?</a:t>
+            </a:r>
+          </a:p>
+        </p:txBody>
+      </p:sp>
+      <p:sp>
+        <p:nvSpPr>
+          <p:cNvPr id="63491" name="Rectangle 3"/>
+          <p:cNvSpPr>
+            <a:spLocks noGrp="1" noChangeArrowheads="1"/>
+          </p:cNvSpPr>
+          <p:nvPr>
+            <p:ph type="body" idx="1"/>
+          </p:nvPr>
+        </p:nvSpPr>
+        <p:spPr/>
+        <p:txBody>
+          <a:bodyPr/>
+          <a:lstStyle/>
+          <a:p>
+            <a:pPr>
+              <a:lnSpc>
+                <a:spcPct val="90000"/>
+              </a:lnSpc>
+            </a:pPr>
+            <a:r>
+              <a:rPr lang="en-US" altLang="en-US" dirty="0"/>
+              <a:t>Using this style, we could write the interpreter in any language that provides a means of creating records.</a:t>
+            </a:r>
+          </a:p>
+          <a:p>
+            <a:pPr>
+              <a:lnSpc>
+                <a:spcPct val="90000"/>
+              </a:lnSpc>
+              <a:spcBef>
+                <a:spcPts val="2400"/>
+              </a:spcBef>
+            </a:pPr>
+            <a:r>
+              <a:rPr lang="en-US" altLang="en-US" dirty="0"/>
+              <a:t>But it would be inefficient if that language's compiler does not handle tail-recursion properly </a:t>
+            </a:r>
+          </a:p>
+          <a:p>
+            <a:pPr lvl="1">
+              <a:lnSpc>
+                <a:spcPct val="90000"/>
+              </a:lnSpc>
+              <a:spcBef>
+                <a:spcPts val="1200"/>
+              </a:spcBef>
+            </a:pPr>
+            <a:r>
+              <a:rPr lang="en-US" altLang="en-US" dirty="0"/>
+              <a:t>Could even result in a stack overflow.</a:t>
+            </a:r>
+          </a:p>
+          <a:p>
+            <a:pPr>
+              <a:lnSpc>
+                <a:spcPct val="90000"/>
+              </a:lnSpc>
+              <a:spcBef>
+                <a:spcPts val="2400"/>
+              </a:spcBef>
+            </a:pPr>
+            <a:r>
+              <a:rPr lang="en-US" altLang="en-US" dirty="0"/>
+              <a:t>So we transform to a style in which the flow of control is really just assignments, BEGINs, IFs,  and GOTOs:</a:t>
+            </a:r>
+          </a:p>
+        </p:txBody>
+      </p:sp>
+    </p:spTree>
+    <p:extLst>
+      <p:ext uri="{BB962C8B-B14F-4D97-AF65-F5344CB8AC3E}">
+        <p14:creationId xmlns:p14="http://schemas.microsoft.com/office/powerpoint/2010/main" val="4046433412"/>
+      </p:ext>
+    </p:extLst>
+  </p:cSld>
+  <p:clrMapOvr>
+    <a:masterClrMapping/>
+  </p:clrMapOvr>
+</p:sld>
+</file>
+
+<file path=ppt/slides/slide21.xml><?xml version="1.0" encoding="utf-8"?>
+<p:sld xmlns:a="http://schemas.openxmlformats.org/drawingml/2006/main" xmlns:r="http://schemas.openxmlformats.org/officeDocument/2006/relationships" xmlns:p="http://schemas.openxmlformats.org/presentationml/2006/main">
+  <p:cSld>
+    <p:spTree>
+      <p:nvGrpSpPr>
+        <p:cNvPr id="1" name=""/>
+        <p:cNvGrpSpPr/>
+        <p:nvPr/>
+      </p:nvGrpSpPr>
+      <p:grpSpPr>
+        <a:xfrm>
+          <a:off x="0" y="0"/>
+          <a:ext cx="0" cy="0"/>
+          <a:chOff x="0" y="0"/>
+          <a:chExt cx="0" cy="0"/>
+        </a:xfrm>
+      </p:grpSpPr>
+      <p:sp>
+        <p:nvSpPr>
+          <p:cNvPr id="59394" name="Rectangle 2"/>
+          <p:cNvSpPr>
+            <a:spLocks noGrp="1" noChangeArrowheads="1"/>
+          </p:cNvSpPr>
+          <p:nvPr>
+            <p:ph type="title"/>
+          </p:nvPr>
+        </p:nvSpPr>
+        <p:spPr>
+          <a:xfrm>
+            <a:off x="1981200" y="0"/>
+            <a:ext cx="8229600" cy="1143000"/>
+          </a:xfrm>
+        </p:spPr>
+        <p:txBody>
+          <a:bodyPr/>
+          <a:lstStyle/>
+          <a:p>
+            <a:r>
+              <a:rPr lang="en-US" altLang="en-US" dirty="0"/>
+              <a:t>Transform to Imperative form</a:t>
+            </a:r>
+          </a:p>
+        </p:txBody>
+      </p:sp>
+      <p:sp>
+        <p:nvSpPr>
+          <p:cNvPr id="59395" name="Rectangle 3"/>
+          <p:cNvSpPr>
+            <a:spLocks noGrp="1" noChangeArrowheads="1"/>
+          </p:cNvSpPr>
+          <p:nvPr>
+            <p:ph type="body" idx="1"/>
+          </p:nvPr>
+        </p:nvSpPr>
+        <p:spPr>
+          <a:xfrm>
+            <a:off x="609600" y="1143000"/>
+            <a:ext cx="11506200" cy="4876800"/>
+          </a:xfrm>
+        </p:spPr>
+        <p:txBody>
+          <a:bodyPr/>
+          <a:lstStyle/>
+          <a:p>
+            <a:pPr>
+              <a:spcBef>
+                <a:spcPts val="2400"/>
+              </a:spcBef>
+            </a:pPr>
+            <a:r>
+              <a:rPr lang="en-US" altLang="en-US" dirty="0"/>
+              <a:t>All substantial procedures will be called in tail-position, so they do not need to return. </a:t>
+            </a:r>
+          </a:p>
+          <a:p>
+            <a:pPr>
+              <a:spcBef>
+                <a:spcPts val="2400"/>
+              </a:spcBef>
+            </a:pPr>
+            <a:r>
+              <a:rPr lang="en-US" altLang="en-US" dirty="0"/>
+              <a:t>All substantial procedures will be thunks (procedures that take  no arguments), thus there is no need to have stack frames that hold parameters.  </a:t>
+            </a:r>
+          </a:p>
+          <a:p>
+            <a:pPr>
+              <a:spcBef>
+                <a:spcPts val="2400"/>
+              </a:spcBef>
+            </a:pPr>
+            <a:r>
+              <a:rPr lang="en-US" altLang="en-US" dirty="0"/>
+              <a:t>Thus each substantial procedure call is equivalent to a "</a:t>
+            </a:r>
+            <a:r>
+              <a:rPr lang="en-US" altLang="en-US" dirty="0" err="1"/>
+              <a:t>goto</a:t>
+            </a:r>
+            <a:r>
+              <a:rPr lang="en-US" altLang="en-US" dirty="0"/>
+              <a:t>"</a:t>
+            </a:r>
+          </a:p>
+          <a:p>
+            <a:pPr>
+              <a:spcBef>
+                <a:spcPts val="2400"/>
+              </a:spcBef>
+            </a:pPr>
+            <a:r>
+              <a:rPr lang="en-US" altLang="en-US" dirty="0"/>
+              <a:t>This can be implemented in almost any language.</a:t>
+            </a:r>
+          </a:p>
+        </p:txBody>
+      </p:sp>
+    </p:spTree>
+    <p:extLst>
+      <p:ext uri="{BB962C8B-B14F-4D97-AF65-F5344CB8AC3E}">
+        <p14:creationId xmlns:p14="http://schemas.microsoft.com/office/powerpoint/2010/main" val="2776800077"/>
+      </p:ext>
+    </p:extLst>
+  </p:cSld>
+  <p:clrMapOvr>
+    <a:masterClrMapping/>
+  </p:clrMapOvr>
+</p:sld>
+</file>
+
+<file path=ppt/slides/slide22.xml><?xml version="1.0" encoding="utf-8"?>
+<p:sld xmlns:a="http://schemas.openxmlformats.org/drawingml/2006/main" xmlns:r="http://schemas.openxmlformats.org/officeDocument/2006/relationships" xmlns:p="http://schemas.openxmlformats.org/presentationml/2006/main">
+  <p:cSld>
+    <p:spTree>
+      <p:nvGrpSpPr>
+        <p:cNvPr id="1" name=""/>
+        <p:cNvGrpSpPr/>
+        <p:nvPr/>
+      </p:nvGrpSpPr>
+      <p:grpSpPr>
+        <a:xfrm>
+          <a:off x="0" y="0"/>
+          <a:ext cx="0" cy="0"/>
+          <a:chOff x="0" y="0"/>
+          <a:chExt cx="0" cy="0"/>
+        </a:xfrm>
+      </p:grpSpPr>
+      <p:sp>
+        <p:nvSpPr>
+          <p:cNvPr id="2" name="Title 1">
+            <a:extLst>
+              <a:ext uri="{FF2B5EF4-FFF2-40B4-BE49-F238E27FC236}">
+                <a16:creationId xmlns:a16="http://schemas.microsoft.com/office/drawing/2014/main" id="{2C9BFF5E-EE3A-4EB6-9181-CC87C1BD1AB8}"/>
+              </a:ext>
+            </a:extLst>
+          </p:cNvPr>
+          <p:cNvSpPr>
+            <a:spLocks noGrp="1"/>
+          </p:cNvSpPr>
+          <p:nvPr>
+            <p:ph type="title"/>
+          </p:nvPr>
+        </p:nvSpPr>
+        <p:spPr/>
+        <p:txBody>
+          <a:bodyPr/>
+          <a:lstStyle/>
+          <a:p>
+            <a:r>
+              <a:rPr lang="en-US" dirty="0"/>
+              <a:t>Transform to imperative form</a:t>
+            </a:r>
+          </a:p>
+        </p:txBody>
+      </p:sp>
+      <p:sp>
+        <p:nvSpPr>
+          <p:cNvPr id="3" name="Content Placeholder 2">
+            <a:extLst>
+              <a:ext uri="{FF2B5EF4-FFF2-40B4-BE49-F238E27FC236}">
+                <a16:creationId xmlns:a16="http://schemas.microsoft.com/office/drawing/2014/main" id="{C51F9E19-203E-4307-8A85-14C4601884E4}"/>
+              </a:ext>
+            </a:extLst>
+          </p:cNvPr>
+          <p:cNvSpPr>
+            <a:spLocks noGrp="1"/>
+          </p:cNvSpPr>
+          <p:nvPr>
+            <p:ph idx="1"/>
+          </p:nvPr>
+        </p:nvSpPr>
+        <p:spPr/>
+        <p:txBody>
+          <a:bodyPr/>
+          <a:lstStyle/>
+          <a:p>
+            <a:pPr>
+              <a:spcBef>
+                <a:spcPts val="2400"/>
+              </a:spcBef>
+            </a:pPr>
+            <a:r>
+              <a:rPr lang="en-US" dirty="0"/>
+              <a:t>Get the code for your section from Live-in-class.</a:t>
+            </a:r>
+          </a:p>
+          <a:p>
+            <a:pPr>
+              <a:spcBef>
+                <a:spcPts val="2400"/>
+              </a:spcBef>
+            </a:pPr>
+            <a:r>
+              <a:rPr lang="en-US" dirty="0"/>
+              <a:t>Transform to imperative form.</a:t>
+            </a:r>
+          </a:p>
+          <a:p>
+            <a:pPr>
+              <a:spcBef>
+                <a:spcPts val="2400"/>
+              </a:spcBef>
+            </a:pPr>
+            <a:r>
+              <a:rPr lang="en-US" dirty="0"/>
+              <a:t>Be sure to look at the tracing mechanism.</a:t>
+            </a:r>
+          </a:p>
+        </p:txBody>
+      </p:sp>
+    </p:spTree>
+    <p:extLst>
+      <p:ext uri="{BB962C8B-B14F-4D97-AF65-F5344CB8AC3E}">
+        <p14:creationId xmlns:p14="http://schemas.microsoft.com/office/powerpoint/2010/main" val="390430155"/>
+      </p:ext>
+    </p:extLst>
+  </p:cSld>
+  <p:clrMapOvr>
+    <a:masterClrMapping/>
+  </p:clrMapOvr>
+</p:sld>
+</file>
+
+<file path=ppt/slides/slide23.xml><?xml version="1.0" encoding="utf-8"?>
 <p:sld xmlns:a="http://schemas.openxmlformats.org/drawingml/2006/main" xmlns:r="http://schemas.openxmlformats.org/officeDocument/2006/relationships" xmlns:p="http://schemas.openxmlformats.org/presentationml/2006/main" show="0">
   <p:cSld>
     <p:spTree>
@@ -6932,7 +7496,7 @@
 </p:sld>
 </file>
 
-<file path=ppt/slides/slide21.xml><?xml version="1.0" encoding="utf-8"?>
+<file path=ppt/slides/slide24.xml><?xml version="1.0" encoding="utf-8"?>
 <p:sld xmlns:a="http://schemas.openxmlformats.org/drawingml/2006/main" xmlns:r="http://schemas.openxmlformats.org/officeDocument/2006/relationships" xmlns:p="http://schemas.openxmlformats.org/presentationml/2006/main" show="0">
   <p:cSld>
     <p:spTree>
@@ -7125,7 +7689,7 @@
 </p:sld>
 </file>
 
-<file path=ppt/slides/slide22.xml><?xml version="1.0" encoding="utf-8"?>
+<file path=ppt/slides/slide25.xml><?xml version="1.0" encoding="utf-8"?>
 <p:sld xmlns:a="http://schemas.openxmlformats.org/drawingml/2006/main" xmlns:r="http://schemas.openxmlformats.org/officeDocument/2006/relationships" xmlns:p="http://schemas.openxmlformats.org/presentationml/2006/main">
   <p:cSld>
     <p:spTree>
@@ -7257,7 +7821,7 @@
 </p:sld>
 </file>
 
-<file path=ppt/slides/slide23.xml><?xml version="1.0" encoding="utf-8"?>
+<file path=ppt/slides/slide26.xml><?xml version="1.0" encoding="utf-8"?>
 <p:sld xmlns:a="http://schemas.openxmlformats.org/drawingml/2006/main" xmlns:r="http://schemas.openxmlformats.org/officeDocument/2006/relationships" xmlns:p="http://schemas.openxmlformats.org/presentationml/2006/main">
   <p:cSld>
     <p:spTree>
@@ -7373,38 +7937,10 @@
       </p:grpSpPr>
       <p:sp>
         <p:nvSpPr>
-          <p:cNvPr id="2" name="Title 1">
-            <a:extLst>
-              <a:ext uri="{FF2B5EF4-FFF2-40B4-BE49-F238E27FC236}">
-                <a16:creationId xmlns:a16="http://schemas.microsoft.com/office/drawing/2014/main" id="{5F2B4A33-CD84-4CCE-A229-E0A3621F604C}"/>
-              </a:ext>
-            </a:extLst>
-          </p:cNvPr>
-          <p:cNvSpPr>
-            <a:spLocks noGrp="1"/>
-          </p:cNvSpPr>
-          <p:nvPr>
-            <p:ph type="title"/>
-          </p:nvPr>
-        </p:nvSpPr>
-        <p:spPr/>
-        <p:txBody>
-          <a:bodyPr/>
-          <a:lstStyle/>
-          <a:p>
-            <a:r>
-              <a:rPr lang="en-US" dirty="0"/>
-              <a:t>What is the difference between an interpreter and a complier?</a:t>
-            </a:r>
-          </a:p>
-        </p:txBody>
-      </p:sp>
-      <p:sp>
-        <p:nvSpPr>
           <p:cNvPr id="3" name="Content Placeholder 2">
             <a:extLst>
               <a:ext uri="{FF2B5EF4-FFF2-40B4-BE49-F238E27FC236}">
-                <a16:creationId xmlns:a16="http://schemas.microsoft.com/office/drawing/2014/main" id="{DB511D2D-6886-465D-92FF-BDC7F04EDDEF}"/>
+                <a16:creationId xmlns:a16="http://schemas.microsoft.com/office/drawing/2014/main" id="{CE98D5F7-052A-400E-800B-6D599061E750}"/>
               </a:ext>
             </a:extLst>
           </p:cNvPr>
@@ -7417,40 +7953,417 @@
         </p:nvSpPr>
         <p:spPr>
           <a:xfrm>
-            <a:off x="609600" y="1905000"/>
-            <a:ext cx="10972800" cy="4221164"/>
+            <a:off x="457200" y="845219"/>
+            <a:ext cx="9925050" cy="3965972"/>
           </a:xfrm>
         </p:spPr>
         <p:txBody>
           <a:bodyPr/>
           <a:lstStyle/>
           <a:p>
+            <a:pPr marL="0" indent="0">
+              <a:buNone/>
+            </a:pPr>
+            <a:r>
+              <a:rPr lang="en-US" sz="1800" b="1" dirty="0">
+                <a:latin typeface="Courier New" panose="02070309020205020404" pitchFamily="49" charset="0"/>
+                <a:cs typeface="Courier New" panose="02070309020205020404" pitchFamily="49" charset="0"/>
+              </a:rPr>
+              <a:t>(let ([a 3]</a:t>
+            </a:r>
+          </a:p>
+          <a:p>
+            <a:pPr marL="0" indent="0">
+              <a:buNone/>
+            </a:pPr>
+            <a:r>
+              <a:rPr lang="en-US" sz="1800" b="1" dirty="0">
+                <a:latin typeface="Courier New" panose="02070309020205020404" pitchFamily="49" charset="0"/>
+                <a:cs typeface="Courier New" panose="02070309020205020404" pitchFamily="49" charset="0"/>
+              </a:rPr>
+              <a:t>      [b 4]</a:t>
+            </a:r>
+          </a:p>
+          <a:p>
+            <a:pPr marL="0" indent="0">
+              <a:buNone/>
+            </a:pPr>
+            <a:r>
+              <a:rPr lang="en-US" sz="1800" b="1" dirty="0">
+                <a:latin typeface="Courier New" panose="02070309020205020404" pitchFamily="49" charset="0"/>
+                <a:cs typeface="Courier New" panose="02070309020205020404" pitchFamily="49" charset="0"/>
+              </a:rPr>
+              <a:t>      [rotate (lambda (x (ref y) (ref z)) </a:t>
+            </a:r>
+          </a:p>
+          <a:p>
+            <a:pPr marL="0" indent="0">
+              <a:buNone/>
+            </a:pPr>
+            <a:r>
+              <a:rPr lang="en-US" sz="1800" b="1" dirty="0">
+                <a:latin typeface="Courier New" panose="02070309020205020404" pitchFamily="49" charset="0"/>
+                <a:cs typeface="Courier New" panose="02070309020205020404" pitchFamily="49" charset="0"/>
+              </a:rPr>
+              <a:t>		(let ([temp x])</a:t>
+            </a:r>
+          </a:p>
+          <a:p>
+            <a:pPr marL="0" indent="0">
+              <a:buNone/>
+            </a:pPr>
+            <a:r>
+              <a:rPr lang="en-US" sz="1800" b="1" dirty="0">
+                <a:latin typeface="Courier New" panose="02070309020205020404" pitchFamily="49" charset="0"/>
+                <a:cs typeface="Courier New" panose="02070309020205020404" pitchFamily="49" charset="0"/>
+              </a:rPr>
+              <a:t>		  (set! x y)</a:t>
+            </a:r>
+          </a:p>
+          <a:p>
+            <a:pPr marL="0" indent="0">
+              <a:buNone/>
+            </a:pPr>
+            <a:r>
+              <a:rPr lang="en-US" sz="1800" b="1" dirty="0">
+                <a:latin typeface="Courier New" panose="02070309020205020404" pitchFamily="49" charset="0"/>
+                <a:cs typeface="Courier New" panose="02070309020205020404" pitchFamily="49" charset="0"/>
+              </a:rPr>
+              <a:t>		  (set! y z)</a:t>
+            </a:r>
+          </a:p>
+          <a:p>
+            <a:pPr marL="0" indent="0">
+              <a:buNone/>
+            </a:pPr>
+            <a:r>
+              <a:rPr lang="en-US" sz="1800" b="1" dirty="0">
+                <a:latin typeface="Courier New" panose="02070309020205020404" pitchFamily="49" charset="0"/>
+                <a:cs typeface="Courier New" panose="02070309020205020404" pitchFamily="49" charset="0"/>
+              </a:rPr>
+              <a:t>		  (set! z temp)</a:t>
+            </a:r>
+          </a:p>
+          <a:p>
+            <a:pPr marL="0" indent="0">
+              <a:buNone/>
+            </a:pPr>
+            <a:r>
+              <a:rPr lang="en-US" sz="1800" b="1" dirty="0">
+                <a:latin typeface="Courier New" panose="02070309020205020404" pitchFamily="49" charset="0"/>
+                <a:cs typeface="Courier New" panose="02070309020205020404" pitchFamily="49" charset="0"/>
+              </a:rPr>
+              <a:t>		  (list x y z)))])</a:t>
+            </a:r>
+          </a:p>
+          <a:p>
+            <a:pPr marL="0" indent="0">
+              <a:buNone/>
+            </a:pPr>
+            <a:r>
+              <a:rPr lang="en-US" sz="1800" b="1" dirty="0">
+                <a:latin typeface="Courier New" panose="02070309020205020404" pitchFamily="49" charset="0"/>
+                <a:cs typeface="Courier New" panose="02070309020205020404" pitchFamily="49" charset="0"/>
+              </a:rPr>
+              <a:t>  (let ([result (rotate a b (+ a b))])</a:t>
+            </a:r>
+          </a:p>
+          <a:p>
+            <a:pPr marL="0" indent="0">
+              <a:buNone/>
+            </a:pPr>
+            <a:r>
+              <a:rPr lang="en-US" sz="1800" b="1" dirty="0">
+                <a:latin typeface="Courier New" panose="02070309020205020404" pitchFamily="49" charset="0"/>
+                <a:cs typeface="Courier New" panose="02070309020205020404" pitchFamily="49" charset="0"/>
+              </a:rPr>
+              <a:t>    (list a b result)))</a:t>
+            </a:r>
+          </a:p>
+          <a:p>
+            <a:pPr marL="0" indent="0">
+              <a:buNone/>
+            </a:pPr>
+            <a:endParaRPr lang="en-US" sz="675" b="1" dirty="0">
+              <a:latin typeface="Courier New" panose="02070309020205020404" pitchFamily="49" charset="0"/>
+              <a:cs typeface="Courier New" panose="02070309020205020404" pitchFamily="49" charset="0"/>
+            </a:endParaRPr>
+          </a:p>
+          <a:p>
+            <a:pPr marL="0" indent="0">
+              <a:buNone/>
+            </a:pPr>
+            <a:r>
+              <a:rPr lang="en-US" sz="2400" b="1" dirty="0">
+                <a:solidFill>
+                  <a:srgbClr val="FF0000"/>
+                </a:solidFill>
+                <a:cs typeface="Courier New" panose="02070309020205020404" pitchFamily="49" charset="0"/>
+              </a:rPr>
+              <a:t>What interpreter changes are needed before we call </a:t>
+            </a:r>
+            <a:r>
+              <a:rPr lang="en-US" sz="2400" b="1" dirty="0">
+                <a:solidFill>
+                  <a:srgbClr val="FF0000"/>
+                </a:solidFill>
+                <a:latin typeface="Courier New" panose="02070309020205020404" pitchFamily="49" charset="0"/>
+                <a:cs typeface="Courier New" panose="02070309020205020404" pitchFamily="49" charset="0"/>
+              </a:rPr>
+              <a:t>apply-proc</a:t>
+            </a:r>
+            <a:r>
+              <a:rPr lang="en-US" sz="2400" b="1" dirty="0">
+                <a:solidFill>
+                  <a:srgbClr val="FF0000"/>
+                </a:solidFill>
+                <a:cs typeface="Courier New" panose="02070309020205020404" pitchFamily="49" charset="0"/>
+              </a:rPr>
+              <a:t>?  </a:t>
+            </a:r>
+            <a:r>
+              <a:rPr lang="en-US" sz="1600" b="1" dirty="0">
+                <a:solidFill>
+                  <a:schemeClr val="accent1">
+                    <a:lumMod val="10000"/>
+                  </a:schemeClr>
+                </a:solidFill>
+                <a:cs typeface="Courier New" panose="02070309020205020404" pitchFamily="49" charset="0"/>
+              </a:rPr>
+              <a:t>Mainly a change to </a:t>
+            </a:r>
+            <a:r>
+              <a:rPr lang="en-US" sz="1600" b="1" dirty="0">
+                <a:solidFill>
+                  <a:schemeClr val="accent1">
+                    <a:lumMod val="10000"/>
+                  </a:schemeClr>
+                </a:solidFill>
+                <a:latin typeface="Courier New" panose="02070309020205020404" pitchFamily="49" charset="0"/>
+                <a:cs typeface="Courier New" panose="02070309020205020404" pitchFamily="49" charset="0"/>
+              </a:rPr>
+              <a:t>eval-</a:t>
+            </a:r>
+            <a:r>
+              <a:rPr lang="en-US" sz="1600" b="1" dirty="0" err="1">
+                <a:solidFill>
+                  <a:schemeClr val="accent1">
+                    <a:lumMod val="10000"/>
+                  </a:schemeClr>
+                </a:solidFill>
+                <a:latin typeface="Courier New" panose="02070309020205020404" pitchFamily="49" charset="0"/>
+                <a:cs typeface="Courier New" panose="02070309020205020404" pitchFamily="49" charset="0"/>
+              </a:rPr>
+              <a:t>rands</a:t>
+            </a:r>
+            <a:r>
+              <a:rPr lang="en-US" sz="1600" b="1" dirty="0">
+                <a:solidFill>
+                  <a:schemeClr val="accent1">
+                    <a:lumMod val="10000"/>
+                  </a:schemeClr>
+                </a:solidFill>
+                <a:cs typeface="Courier New" panose="02070309020205020404" pitchFamily="49" charset="0"/>
+              </a:rPr>
+              <a:t>: return a list of cells instead of a list of values.</a:t>
+            </a:r>
+            <a:br>
+              <a:rPr lang="en-US" sz="1600" b="1" dirty="0">
+                <a:solidFill>
+                  <a:schemeClr val="accent1">
+                    <a:lumMod val="10000"/>
+                  </a:schemeClr>
+                </a:solidFill>
+                <a:cs typeface="Courier New" panose="02070309020205020404" pitchFamily="49" charset="0"/>
+              </a:rPr>
+            </a:br>
+            <a:endParaRPr lang="en-US" sz="1600" b="1" dirty="0">
+              <a:solidFill>
+                <a:schemeClr val="accent1">
+                  <a:lumMod val="10000"/>
+                </a:schemeClr>
+              </a:solidFill>
+              <a:cs typeface="Courier New" panose="02070309020205020404" pitchFamily="49" charset="0"/>
+            </a:endParaRPr>
+          </a:p>
+          <a:p>
+            <a:pPr marL="0" indent="0">
+              <a:buNone/>
+            </a:pPr>
+            <a:r>
+              <a:rPr lang="en-US" sz="2400" b="1" dirty="0">
+                <a:solidFill>
+                  <a:srgbClr val="FF3300"/>
+                </a:solidFill>
+                <a:cs typeface="Courier New" panose="02070309020205020404" pitchFamily="49" charset="0"/>
+              </a:rPr>
+              <a:t>What interpreter changes are needed in the </a:t>
+            </a:r>
+            <a:r>
+              <a:rPr lang="en-US" sz="2400" b="1" dirty="0">
+                <a:solidFill>
+                  <a:srgbClr val="FF3300"/>
+                </a:solidFill>
+                <a:latin typeface="Courier New" panose="02070309020205020404" pitchFamily="49" charset="0"/>
+                <a:cs typeface="Courier New" panose="02070309020205020404" pitchFamily="49" charset="0"/>
+              </a:rPr>
+              <a:t>apply-proc</a:t>
+            </a:r>
+            <a:r>
+              <a:rPr lang="en-US" sz="2400" b="1" dirty="0">
+                <a:solidFill>
+                  <a:srgbClr val="FF3300"/>
+                </a:solidFill>
+                <a:cs typeface="Courier New" panose="02070309020205020404" pitchFamily="49" charset="0"/>
+              </a:rPr>
+              <a:t> closure case?  </a:t>
+            </a:r>
+            <a:r>
+              <a:rPr lang="en-US" sz="1600" b="1" dirty="0">
+                <a:solidFill>
+                  <a:schemeClr val="accent1">
+                    <a:lumMod val="10000"/>
+                  </a:schemeClr>
+                </a:solidFill>
+                <a:cs typeface="Courier New" panose="02070309020205020404" pitchFamily="49" charset="0"/>
+              </a:rPr>
+              <a:t>If it’s not a </a:t>
+            </a:r>
+            <a:r>
+              <a:rPr lang="en-US" sz="1600" b="1" dirty="0">
+                <a:solidFill>
+                  <a:schemeClr val="accent1">
+                    <a:lumMod val="10000"/>
+                  </a:schemeClr>
+                </a:solidFill>
+                <a:latin typeface="Courier New" panose="02070309020205020404" pitchFamily="49" charset="0"/>
+                <a:cs typeface="Courier New" panose="02070309020205020404" pitchFamily="49" charset="0"/>
+              </a:rPr>
+              <a:t>ref</a:t>
+            </a:r>
+            <a:r>
+              <a:rPr lang="en-US" sz="1600" b="1" dirty="0">
+                <a:solidFill>
+                  <a:schemeClr val="accent1">
+                    <a:lumMod val="10000"/>
+                  </a:schemeClr>
+                </a:solidFill>
+                <a:cs typeface="Courier New" panose="02070309020205020404" pitchFamily="49" charset="0"/>
+              </a:rPr>
+              <a:t> param, put the corresponding argument value in a </a:t>
+            </a:r>
+            <a:r>
+              <a:rPr lang="en-US" sz="1600" b="1" i="1" dirty="0">
+                <a:solidFill>
+                  <a:schemeClr val="accent1">
+                    <a:lumMod val="10000"/>
+                  </a:schemeClr>
+                </a:solidFill>
+                <a:cs typeface="Courier New" panose="02070309020205020404" pitchFamily="49" charset="0"/>
+              </a:rPr>
+              <a:t>new</a:t>
+            </a:r>
+            <a:r>
+              <a:rPr lang="en-US" sz="1600" b="1" dirty="0">
+                <a:solidFill>
+                  <a:schemeClr val="accent1">
+                    <a:lumMod val="10000"/>
+                  </a:schemeClr>
+                </a:solidFill>
+                <a:cs typeface="Courier New" panose="02070309020205020404" pitchFamily="49" charset="0"/>
+              </a:rPr>
+              <a:t> cell.</a:t>
+            </a:r>
+            <a:endParaRPr lang="en-US" sz="2400" b="1" dirty="0">
+              <a:solidFill>
+                <a:schemeClr val="accent1">
+                  <a:lumMod val="10000"/>
+                </a:schemeClr>
+              </a:solidFill>
+              <a:cs typeface="Courier New" panose="02070309020205020404" pitchFamily="49" charset="0"/>
+            </a:endParaRPr>
+          </a:p>
+        </p:txBody>
+      </p:sp>
+      <p:sp>
+        <p:nvSpPr>
+          <p:cNvPr id="2" name="TextBox 1">
+            <a:extLst>
+              <a:ext uri="{FF2B5EF4-FFF2-40B4-BE49-F238E27FC236}">
+                <a16:creationId xmlns:a16="http://schemas.microsoft.com/office/drawing/2014/main" id="{8B3E152A-066A-427C-BF1E-67384419E704}"/>
+              </a:ext>
+            </a:extLst>
+          </p:cNvPr>
+          <p:cNvSpPr txBox="1"/>
+          <p:nvPr/>
+        </p:nvSpPr>
+        <p:spPr>
+          <a:xfrm>
+            <a:off x="6858000" y="1752600"/>
+            <a:ext cx="3657600" cy="1200329"/>
+          </a:xfrm>
+          <a:prstGeom prst="rect">
+            <a:avLst/>
+          </a:prstGeom>
+          <a:noFill/>
+          <a:ln w="28575">
+            <a:solidFill>
+              <a:srgbClr val="FF3300"/>
+            </a:solidFill>
+          </a:ln>
+        </p:spPr>
+        <p:txBody>
+          <a:bodyPr wrap="square" rtlCol="0">
+            <a:spAutoFit/>
+          </a:bodyPr>
+          <a:lstStyle/>
+          <a:p>
             <a:r>
               <a:rPr lang="en-US" dirty="0"/>
-              <a:t>Interpreter is a program that runs another program (e.g. petite is a program that runs .ss scheme programs)</a:t>
-            </a:r>
-          </a:p>
-          <a:p>
+              <a:t>A small change to the </a:t>
+            </a:r>
+            <a:r>
+              <a:rPr lang="en-US" dirty="0">
+                <a:latin typeface="Courier New" panose="02070309020205020404" pitchFamily="49" charset="0"/>
+                <a:cs typeface="Courier New" panose="02070309020205020404" pitchFamily="49" charset="0"/>
+              </a:rPr>
+              <a:t>expression</a:t>
+            </a:r>
             <a:r>
               <a:rPr lang="en-US" dirty="0"/>
-              <a:t>Hopefully at this point you feel confident implementing interpreters – after A18 hopefully you feel confident implementing high level interpreters in low languages</a:t>
+              <a:t> datatype definition.</a:t>
             </a:r>
           </a:p>
           <a:p>
             <a:r>
               <a:rPr lang="en-US" dirty="0"/>
-              <a:t>Complier is a program that outputs an assembly language program (broadly)</a:t>
-            </a:r>
-          </a:p>
-          <a:p>
-            <a:endParaRPr lang="en-US" dirty="0"/>
+              <a:t>No changes to </a:t>
+            </a:r>
+            <a:r>
+              <a:rPr lang="en-US" dirty="0">
+                <a:latin typeface="Courier New" panose="02070309020205020404" pitchFamily="49" charset="0"/>
+                <a:cs typeface="Courier New" panose="02070309020205020404" pitchFamily="49" charset="0"/>
+              </a:rPr>
+              <a:t>parse-exp</a:t>
+            </a:r>
+            <a:r>
+              <a:rPr lang="en-US" dirty="0"/>
+              <a:t> or </a:t>
+            </a:r>
+            <a:r>
+              <a:rPr lang="en-US" dirty="0">
+                <a:latin typeface="Courier New" panose="02070309020205020404" pitchFamily="49" charset="0"/>
+                <a:cs typeface="Courier New" panose="02070309020205020404" pitchFamily="49" charset="0"/>
+              </a:rPr>
+              <a:t>syntax-expand</a:t>
+            </a:r>
           </a:p>
         </p:txBody>
       </p:sp>
     </p:spTree>
     <p:extLst>
       <p:ext uri="{BB962C8B-B14F-4D97-AF65-F5344CB8AC3E}">
-        <p14:creationId xmlns:p14="http://schemas.microsoft.com/office/powerpoint/2010/main" val="433729595"/>
+        <p14:creationId xmlns:p14="http://schemas.microsoft.com/office/powerpoint/2010/main" val="387688988"/>
       </p:ext>
     </p:extLst>
   </p:cSld>
@@ -7482,7 +8395,7 @@
           <p:cNvPr id="2" name="Title 1">
             <a:extLst>
               <a:ext uri="{FF2B5EF4-FFF2-40B4-BE49-F238E27FC236}">
-                <a16:creationId xmlns:a16="http://schemas.microsoft.com/office/drawing/2014/main" id="{C3101B86-8B78-4C21-9D9F-193A8FD5E6A5}"/>
+                <a16:creationId xmlns:a16="http://schemas.microsoft.com/office/drawing/2014/main" id="{FE8F4ECD-81DB-43C2-8248-B77C28B3A1CF}"/>
               </a:ext>
             </a:extLst>
           </p:cNvPr>
@@ -7493,14 +8406,19 @@
             <p:ph type="title"/>
           </p:nvPr>
         </p:nvSpPr>
-        <p:spPr/>
+        <p:spPr>
+          <a:xfrm>
+            <a:off x="3009900" y="742950"/>
+            <a:ext cx="6172200" cy="857250"/>
+          </a:xfrm>
+        </p:spPr>
         <p:txBody>
           <a:bodyPr/>
           <a:lstStyle/>
           <a:p>
             <a:r>
               <a:rPr lang="en-US" dirty="0"/>
-              <a:t>Compliers -&gt; Syntax expansion</a:t>
+              <a:t>A change to extend-env</a:t>
             </a:r>
           </a:p>
         </p:txBody>
@@ -7510,7 +8428,7 @@
           <p:cNvPr id="3" name="Content Placeholder 2">
             <a:extLst>
               <a:ext uri="{FF2B5EF4-FFF2-40B4-BE49-F238E27FC236}">
-                <a16:creationId xmlns:a16="http://schemas.microsoft.com/office/drawing/2014/main" id="{7426C66A-8D53-4285-B66B-B2E780423EA9}"/>
+                <a16:creationId xmlns:a16="http://schemas.microsoft.com/office/drawing/2014/main" id="{6161216A-C798-4F3D-894C-AEFE695C0CD6}"/>
               </a:ext>
             </a:extLst>
           </p:cNvPr>
@@ -7521,34 +8439,109 @@
             <p:ph idx="1"/>
           </p:nvPr>
         </p:nvSpPr>
-        <p:spPr/>
+        <p:spPr>
+          <a:xfrm>
+            <a:off x="381000" y="1485901"/>
+            <a:ext cx="10744200" cy="3394472"/>
+          </a:xfrm>
+        </p:spPr>
         <p:txBody>
           <a:bodyPr/>
           <a:lstStyle/>
           <a:p>
+            <a:pPr>
+              <a:spcBef>
+                <a:spcPts val="1800"/>
+              </a:spcBef>
+            </a:pPr>
             <a:r>
               <a:rPr lang="en-US" dirty="0"/>
-              <a:t>Complier is a program that outputs an assembly language program (broadly)</a:t>
-            </a:r>
-          </a:p>
-          <a:p>
+              <a:t>This works for the “cell” representation of references.  It’s slightly more complex for the ribcage representation without cells.</a:t>
+            </a:r>
+          </a:p>
+          <a:p>
+            <a:pPr>
+              <a:spcBef>
+                <a:spcPts val="1800"/>
+              </a:spcBef>
+            </a:pPr>
             <a:r>
               <a:rPr lang="en-US" dirty="0"/>
-              <a:t>Once we convert, henceforth we can run the program directly on the CPU (which you can think of as an interpreter with very limited core forms)</a:t>
-            </a:r>
-          </a:p>
-          <a:p>
+              <a:t>First, </a:t>
+            </a:r>
+            <a:r>
+              <a:rPr lang="en-US" b="1" dirty="0"/>
+              <a:t>modify </a:t>
+            </a:r>
+            <a:r>
+              <a:rPr lang="en-US" dirty="0">
+                <a:latin typeface="Courier New" panose="02070309020205020404" pitchFamily="49" charset="0"/>
+                <a:cs typeface="Courier New" panose="02070309020205020404" pitchFamily="49" charset="0"/>
+              </a:rPr>
+              <a:t>extend-env</a:t>
+            </a:r>
+            <a:r>
+              <a:rPr lang="en-US" b="1" dirty="0"/>
+              <a:t> </a:t>
+            </a:r>
             <a:r>
               <a:rPr lang="en-US" dirty="0"/>
-              <a:t>A complier like a really complex syntax expansion – like your syntax expansion, none of its structures exist at runtime</a:t>
-            </a:r>
+              <a:t>so that its second argument is a list of cells containing the values.  Thus the values are put into the cells </a:t>
+            </a:r>
+            <a:r>
+              <a:rPr lang="en-US" i="1" dirty="0"/>
+              <a:t>before</a:t>
+            </a:r>
+            <a:r>
+              <a:rPr lang="en-US" dirty="0"/>
+              <a:t> calling </a:t>
+            </a:r>
+            <a:r>
+              <a:rPr lang="en-US" dirty="0">
+                <a:latin typeface="Courier New" panose="02070309020205020404" pitchFamily="49" charset="0"/>
+                <a:cs typeface="Courier New" panose="02070309020205020404" pitchFamily="49" charset="0"/>
+              </a:rPr>
+              <a:t>extend-env</a:t>
+            </a:r>
+            <a:r>
+              <a:rPr lang="en-US" dirty="0"/>
+              <a:t>.</a:t>
+            </a:r>
+          </a:p>
+          <a:p>
+            <a:pPr>
+              <a:spcBef>
+                <a:spcPts val="1800"/>
+              </a:spcBef>
+            </a:pPr>
+            <a:r>
+              <a:rPr lang="en-US" dirty="0"/>
+              <a:t>Each level of extended environment will still contain a list or vector of cells, but these cells will not be created by </a:t>
+            </a:r>
+            <a:r>
+              <a:rPr lang="en-US" dirty="0">
+                <a:latin typeface="Courier New" panose="02070309020205020404" pitchFamily="49" charset="0"/>
+                <a:cs typeface="Courier New" panose="02070309020205020404" pitchFamily="49" charset="0"/>
+              </a:rPr>
+              <a:t>extend-env</a:t>
+            </a:r>
+            <a:r>
+              <a:rPr lang="en-US" dirty="0"/>
+              <a:t>.</a:t>
+            </a:r>
+          </a:p>
+          <a:p>
+            <a:endParaRPr lang="en-US" dirty="0"/>
+          </a:p>
+          <a:p>
+            <a:endParaRPr lang="en-US" dirty="0"/>
           </a:p>
         </p:txBody>
       </p:sp>
     </p:spTree>
     <p:extLst>
       <p:ext uri="{BB962C8B-B14F-4D97-AF65-F5344CB8AC3E}">
-        <p14:creationId xmlns:p14="http://schemas.microsoft.com/office/powerpoint/2010/main" val="301299183"/>
+        <p14:creationId xmlns:p14="http://schemas.microsoft.com/office/powerpoint/2010/main" val="1500992104"/>
       </p:ext>
     </p:extLst>
   </p:cSld>
@@ -7577,10 +8570,10 @@
       </p:grpSpPr>
       <p:sp>
         <p:nvSpPr>
-          <p:cNvPr id="2" name="Title 1">
+          <p:cNvPr id="4" name="Title 3">
             <a:extLst>
               <a:ext uri="{FF2B5EF4-FFF2-40B4-BE49-F238E27FC236}">
-                <a16:creationId xmlns:a16="http://schemas.microsoft.com/office/drawing/2014/main" id="{A2B44E8A-AC00-42CA-8D05-B7B14EF82618}"/>
+                <a16:creationId xmlns:a16="http://schemas.microsoft.com/office/drawing/2014/main" id="{BFB9A05F-2F98-4FB5-8021-513117EAD280}"/>
               </a:ext>
             </a:extLst>
           </p:cNvPr>
@@ -7588,7 +8581,7 @@
             <a:spLocks noGrp="1"/>
           </p:cNvSpPr>
           <p:nvPr>
-            <p:ph type="title"/>
+            <p:ph type="ctrTitle"/>
           </p:nvPr>
         </p:nvSpPr>
         <p:spPr/>
@@ -7598,17 +8591,17 @@
           <a:p>
             <a:r>
               <a:rPr lang="en-US" dirty="0"/>
-              <a:t>Syntax expansion</a:t>
+              <a:t>Imperative form</a:t>
             </a:r>
           </a:p>
         </p:txBody>
       </p:sp>
       <p:sp>
         <p:nvSpPr>
-          <p:cNvPr id="3" name="Content Placeholder 2">
+          <p:cNvPr id="5" name="Subtitle 4">
             <a:extLst>
               <a:ext uri="{FF2B5EF4-FFF2-40B4-BE49-F238E27FC236}">
-                <a16:creationId xmlns:a16="http://schemas.microsoft.com/office/drawing/2014/main" id="{11AC16ED-F5ED-48F8-9F9B-461A2D741BAD}"/>
+                <a16:creationId xmlns:a16="http://schemas.microsoft.com/office/drawing/2014/main" id="{5557FABE-AE4D-45A3-A896-99E5BC80D3DC}"/>
               </a:ext>
             </a:extLst>
           </p:cNvPr>
@@ -7616,7 +8609,7 @@
             <a:spLocks noGrp="1"/>
           </p:cNvSpPr>
           <p:nvPr>
-            <p:ph idx="1"/>
+            <p:ph type="subTitle" idx="1"/>
           </p:nvPr>
         </p:nvSpPr>
         <p:spPr/>
@@ -7626,19 +8619,7 @@
           <a:p>
             <a:r>
               <a:rPr lang="en-US" dirty="0"/>
-              <a:t>Could you write a syntax expansion that could convert a scheme function to cps?  I hope you intuit that the answer is yes.</a:t>
-            </a:r>
-          </a:p>
-          <a:p>
-            <a:r>
-              <a:rPr lang="en-US" dirty="0"/>
-              <a:t>Your textbook has the details</a:t>
-            </a:r>
-          </a:p>
-          <a:p>
-            <a:r>
-              <a:rPr lang="en-US" dirty="0"/>
-              <a:t>If we have the capability to do such a syntax expansion, we can convert a high-level language (scheme) to a language more like C.  It doesn’t have things like lambdas – but it does have function calls, parameters – and for that reason “environments”</a:t>
+              <a:t>As close to C or Assembly Language as we can get in Scheme</a:t>
             </a:r>
           </a:p>
         </p:txBody>
@@ -7646,7 +8627,7 @@
     </p:spTree>
     <p:extLst>
       <p:ext uri="{BB962C8B-B14F-4D97-AF65-F5344CB8AC3E}">
-        <p14:creationId xmlns:p14="http://schemas.microsoft.com/office/powerpoint/2010/main" val="635310497"/>
+        <p14:creationId xmlns:p14="http://schemas.microsoft.com/office/powerpoint/2010/main" val="3067851117"/>
       </p:ext>
     </p:extLst>
   </p:cSld>
@@ -7678,7 +8659,7 @@
           <p:cNvPr id="2" name="Title 1">
             <a:extLst>
               <a:ext uri="{FF2B5EF4-FFF2-40B4-BE49-F238E27FC236}">
-                <a16:creationId xmlns:a16="http://schemas.microsoft.com/office/drawing/2014/main" id="{371AD885-CBAA-4AC7-AA55-456B78CA6EE5}"/>
+                <a16:creationId xmlns:a16="http://schemas.microsoft.com/office/drawing/2014/main" id="{5F2B4A33-CD84-4CCE-A229-E0A3621F604C}"/>
               </a:ext>
             </a:extLst>
           </p:cNvPr>
@@ -7696,7 +8677,7 @@
           <a:p>
             <a:r>
               <a:rPr lang="en-US" dirty="0"/>
-              <a:t>Imperative form</a:t>
+              <a:t>What is the difference between an interpreter and a complier?</a:t>
             </a:r>
           </a:p>
         </p:txBody>
@@ -7706,7 +8687,7 @@
           <p:cNvPr id="3" name="Content Placeholder 2">
             <a:extLst>
               <a:ext uri="{FF2B5EF4-FFF2-40B4-BE49-F238E27FC236}">
-                <a16:creationId xmlns:a16="http://schemas.microsoft.com/office/drawing/2014/main" id="{D7116619-236A-4C8E-B34F-42D0A491F917}"/>
+                <a16:creationId xmlns:a16="http://schemas.microsoft.com/office/drawing/2014/main" id="{DB511D2D-6886-465D-92FF-BDC7F04EDDEF}"/>
               </a:ext>
             </a:extLst>
           </p:cNvPr>
@@ -7717,56 +8698,42 @@
             <p:ph idx="1"/>
           </p:nvPr>
         </p:nvSpPr>
-        <p:spPr/>
+        <p:spPr>
+          <a:xfrm>
+            <a:off x="609600" y="1905000"/>
+            <a:ext cx="10972800" cy="4221164"/>
+          </a:xfrm>
+        </p:spPr>
         <p:txBody>
           <a:bodyPr/>
           <a:lstStyle/>
           <a:p>
             <a:r>
               <a:rPr lang="en-US" dirty="0"/>
-              <a:t>Imperative form is a final transformation, that transforms cps-</a:t>
-            </a:r>
-            <a:r>
-              <a:rPr lang="en-US" dirty="0" err="1"/>
-              <a:t>ized</a:t>
-            </a:r>
+              <a:t>Interpreter is a program that runs another program (e.g. petite is a program that runs .ss scheme programs)</a:t>
+            </a:r>
+          </a:p>
+          <a:p>
             <a:r>
               <a:rPr lang="en-US" dirty="0"/>
-              <a:t> code into code that relies on sets and </a:t>
-            </a:r>
-            <a:r>
-              <a:rPr lang="en-US" dirty="0" err="1"/>
-              <a:t>gotos</a:t>
-            </a:r>
+              <a:t>Hopefully at this point you feel confident implementing interpreters – after A18 hopefully you feel confident implementing high level interpreters in low languages</a:t>
+            </a:r>
+          </a:p>
+          <a:p>
+            <a:r>
+              <a:rPr lang="en-US" dirty="0"/>
+              <a:t>Complier is a program that outputs an assembly language program (broadly)</a:t>
+            </a:r>
+          </a:p>
+          <a:p>
             <a:endParaRPr lang="en-US" dirty="0"/>
-          </a:p>
-          <a:p>
-            <a:r>
-              <a:rPr lang="en-US" dirty="0"/>
-              <a:t>This is a form that is very close to what you’d need to actually run the code on a processor with assembly language</a:t>
-            </a:r>
-          </a:p>
-          <a:p>
-            <a:r>
-              <a:rPr lang="en-US" dirty="0"/>
-              <a:t>To build a scheme complier: regular scheme -&gt; cps scheme -&gt; imperative form scheme -&gt; assembly language</a:t>
-            </a:r>
-          </a:p>
-          <a:p>
-            <a:pPr marL="0" indent="0">
-              <a:buNone/>
-            </a:pPr>
-            <a:r>
-              <a:rPr lang="en-US" dirty="0"/>
-              <a:t>* data structures, garbage collection</a:t>
-            </a:r>
           </a:p>
         </p:txBody>
       </p:sp>
     </p:spTree>
     <p:extLst>
       <p:ext uri="{BB962C8B-B14F-4D97-AF65-F5344CB8AC3E}">
-        <p14:creationId xmlns:p14="http://schemas.microsoft.com/office/powerpoint/2010/main" val="1348873358"/>
+        <p14:creationId xmlns:p14="http://schemas.microsoft.com/office/powerpoint/2010/main" val="433729595"/>
       </p:ext>
     </p:extLst>
   </p:cSld>
@@ -7795,9 +8762,15 @@
       </p:grpSpPr>
       <p:sp>
         <p:nvSpPr>
-          <p:cNvPr id="43010" name="Rectangle 2"/>
+          <p:cNvPr id="2" name="Title 1">
+            <a:extLst>
+              <a:ext uri="{FF2B5EF4-FFF2-40B4-BE49-F238E27FC236}">
+                <a16:creationId xmlns:a16="http://schemas.microsoft.com/office/drawing/2014/main" id="{C3101B86-8B78-4C21-9D9F-193A8FD5E6A5}"/>
+              </a:ext>
+            </a:extLst>
+          </p:cNvPr>
           <p:cNvSpPr>
-            <a:spLocks noGrp="1" noChangeArrowheads="1"/>
+            <a:spLocks noGrp="1"/>
           </p:cNvSpPr>
           <p:nvPr>
             <p:ph type="title"/>
@@ -7809,20 +8782,26 @@
           <a:lstStyle/>
           <a:p>
             <a:r>
-              <a:rPr lang="en-US" altLang="en-US"/>
-              <a:t>A simple example</a:t>
+              <a:rPr lang="en-US" dirty="0"/>
+              <a:t>Compliers -&gt; Syntax expansion</a:t>
             </a:r>
           </a:p>
         </p:txBody>
       </p:sp>
       <p:sp>
         <p:nvSpPr>
-          <p:cNvPr id="43011" name="Rectangle 3"/>
+          <p:cNvPr id="3" name="Content Placeholder 2">
+            <a:extLst>
+              <a:ext uri="{FF2B5EF4-FFF2-40B4-BE49-F238E27FC236}">
+                <a16:creationId xmlns:a16="http://schemas.microsoft.com/office/drawing/2014/main" id="{7426C66A-8D53-4285-B66B-B2E780423EA9}"/>
+              </a:ext>
+            </a:extLst>
+          </p:cNvPr>
           <p:cNvSpPr>
-            <a:spLocks noGrp="1" noChangeArrowheads="1"/>
+            <a:spLocks noGrp="1"/>
           </p:cNvSpPr>
           <p:nvPr>
-            <p:ph type="body" idx="1"/>
+            <p:ph idx="1"/>
           </p:nvPr>
         </p:nvSpPr>
         <p:spPr/>
@@ -7830,25 +8809,21 @@
           <a:bodyPr/>
           <a:lstStyle/>
           <a:p>
-            <a:pPr>
-              <a:spcBef>
-                <a:spcPts val="1800"/>
-              </a:spcBef>
-            </a:pPr>
-            <a:r>
-              <a:rPr lang="en-US" altLang="en-US" dirty="0"/>
-              <a:t>We’re not going to have you write stuff to convert scheme code in an automated way – we’re just going to ask you to do the transformation by hand, as you’ve done for cps</a:t>
-            </a:r>
-          </a:p>
-          <a:p>
-            <a:pPr>
-              <a:spcBef>
-                <a:spcPts val="1800"/>
-              </a:spcBef>
-            </a:pPr>
-            <a:r>
-              <a:rPr lang="en-US" altLang="en-US" dirty="0"/>
-              <a:t>The code in these slides is linked from today’s Resources column in the Schedule Page.</a:t>
+            <a:r>
+              <a:rPr lang="en-US" dirty="0"/>
+              <a:t>Complier is a program that outputs an assembly language program (broadly)</a:t>
+            </a:r>
+          </a:p>
+          <a:p>
+            <a:r>
+              <a:rPr lang="en-US" dirty="0"/>
+              <a:t>Once we convert, henceforth we can run the program directly on the CPU (which you can think of as an interpreter with very limited core forms)</a:t>
+            </a:r>
+          </a:p>
+          <a:p>
+            <a:r>
+              <a:rPr lang="en-US" dirty="0"/>
+              <a:t>A complier like a really complex syntax expansion – like your syntax expansion, none of its structures exist at runtime</a:t>
             </a:r>
           </a:p>
         </p:txBody>
@@ -7856,7 +8831,7 @@
     </p:spTree>
     <p:extLst>
       <p:ext uri="{BB962C8B-B14F-4D97-AF65-F5344CB8AC3E}">
-        <p14:creationId xmlns:p14="http://schemas.microsoft.com/office/powerpoint/2010/main" val="4159017883"/>
+        <p14:creationId xmlns:p14="http://schemas.microsoft.com/office/powerpoint/2010/main" val="301299183"/>
       </p:ext>
     </p:extLst>
   </p:cSld>
@@ -7883,225 +8858,84 @@
           <a:chExt cx="0" cy="0"/>
         </a:xfrm>
       </p:grpSpPr>
-      <p:pic>
-        <p:nvPicPr>
-          <p:cNvPr id="3" name="Picture 2"/>
-          <p:cNvPicPr>
-            <a:picLocks noChangeAspect="1"/>
-          </p:cNvPicPr>
-          <p:nvPr/>
-        </p:nvPicPr>
-        <p:blipFill>
-          <a:blip r:embed="rId2"/>
-          <a:stretch>
-            <a:fillRect/>
-          </a:stretch>
-        </p:blipFill>
-        <p:spPr>
-          <a:xfrm>
-            <a:off x="2362200" y="635952"/>
-            <a:ext cx="7995624" cy="5002848"/>
-          </a:xfrm>
-          <a:prstGeom prst="rect">
-            <a:avLst/>
-          </a:prstGeom>
-        </p:spPr>
-      </p:pic>
-      <p:sp>
-        <p:nvSpPr>
-          <p:cNvPr id="44034" name="Rectangle 2"/>
+      <p:sp>
+        <p:nvSpPr>
+          <p:cNvPr id="2" name="Title 1">
+            <a:extLst>
+              <a:ext uri="{FF2B5EF4-FFF2-40B4-BE49-F238E27FC236}">
+                <a16:creationId xmlns:a16="http://schemas.microsoft.com/office/drawing/2014/main" id="{A2B44E8A-AC00-42CA-8D05-B7B14EF82618}"/>
+              </a:ext>
+            </a:extLst>
+          </p:cNvPr>
           <p:cNvSpPr>
-            <a:spLocks noGrp="1" noChangeArrowheads="1"/>
+            <a:spLocks noGrp="1"/>
           </p:cNvSpPr>
           <p:nvPr>
             <p:ph type="title"/>
           </p:nvPr>
         </p:nvSpPr>
-        <p:spPr>
-          <a:xfrm>
-            <a:off x="2895600" y="-76200"/>
-            <a:ext cx="7086600" cy="609600"/>
-          </a:xfrm>
-        </p:spPr>
+        <p:spPr/>
         <p:txBody>
           <a:bodyPr/>
           <a:lstStyle/>
           <a:p>
             <a:r>
-              <a:rPr lang="en-US" altLang="en-US" sz="3200" dirty="0"/>
-              <a:t>A simple example</a:t>
+              <a:rPr lang="en-US" dirty="0"/>
+              <a:t>Syntax expansion</a:t>
             </a:r>
           </a:p>
         </p:txBody>
       </p:sp>
       <p:sp>
         <p:nvSpPr>
-          <p:cNvPr id="44037" name="Text Box 5"/>
-          <p:cNvSpPr txBox="1">
-            <a:spLocks noChangeArrowheads="1"/>
+          <p:cNvPr id="3" name="Content Placeholder 2">
+            <a:extLst>
+              <a:ext uri="{FF2B5EF4-FFF2-40B4-BE49-F238E27FC236}">
+                <a16:creationId xmlns:a16="http://schemas.microsoft.com/office/drawing/2014/main" id="{11AC16ED-F5ED-48F8-9F9B-461A2D741BAD}"/>
+              </a:ext>
+            </a:extLst>
+          </p:cNvPr>
+          <p:cNvSpPr>
+            <a:spLocks noGrp="1"/>
           </p:cNvSpPr>
-          <p:nvPr/>
-        </p:nvSpPr>
-        <p:spPr bwMode="auto">
-          <a:xfrm>
-            <a:off x="5105400" y="1828800"/>
-            <a:ext cx="4876800" cy="641350"/>
-          </a:xfrm>
-          <a:prstGeom prst="rect">
-            <a:avLst/>
-          </a:prstGeom>
-          <a:solidFill>
-            <a:schemeClr val="accent3">
-              <a:lumMod val="95000"/>
-            </a:schemeClr>
-          </a:solidFill>
-          <a:ln>
-            <a:noFill/>
-          </a:ln>
-          <a:effectLst/>
-        </p:spPr>
+          <p:nvPr>
+            <p:ph idx="1"/>
+          </p:nvPr>
+        </p:nvSpPr>
+        <p:spPr/>
         <p:txBody>
-          <a:bodyPr>
-            <a:spAutoFit/>
-          </a:bodyPr>
+          <a:bodyPr/>
           <a:lstStyle/>
           <a:p>
-            <a:pPr>
-              <a:spcBef>
-                <a:spcPct val="50000"/>
-              </a:spcBef>
-            </a:pPr>
-            <a:r>
-              <a:rPr lang="en-US" altLang="en-US" sz="3600" b="1" dirty="0">
-                <a:solidFill>
-                  <a:srgbClr val="990099"/>
-                </a:solidFill>
-              </a:rPr>
-              <a:t>Next: convert to CPS</a:t>
+            <a:r>
+              <a:rPr lang="en-US" dirty="0"/>
+              <a:t>Could you write a syntax expansion that could convert a scheme function to cps?  I hope you intuit that the answer is yes.</a:t>
+            </a:r>
+          </a:p>
+          <a:p>
+            <a:r>
+              <a:rPr lang="en-US" dirty="0"/>
+              <a:t>Your textbook has the details</a:t>
+            </a:r>
+          </a:p>
+          <a:p>
+            <a:r>
+              <a:rPr lang="en-US" dirty="0"/>
+              <a:t>If we have the capability to do such a syntax expansion, we can convert a high-level language (scheme) to a language more like C.  It doesn’t have things like lambdas – but it does have function calls, parameters – and for that reason “environments”</a:t>
             </a:r>
           </a:p>
         </p:txBody>
       </p:sp>
-      <p:pic>
-        <p:nvPicPr>
-          <p:cNvPr id="4" name="Picture 3"/>
-          <p:cNvPicPr>
-            <a:picLocks noChangeAspect="1"/>
-          </p:cNvPicPr>
-          <p:nvPr/>
-        </p:nvPicPr>
-        <p:blipFill>
-          <a:blip r:embed="rId3"/>
-          <a:stretch>
-            <a:fillRect/>
-          </a:stretch>
-        </p:blipFill>
-        <p:spPr>
-          <a:xfrm>
-            <a:off x="2399372" y="5867401"/>
-            <a:ext cx="5830229" cy="748837"/>
-          </a:xfrm>
-          <a:prstGeom prst="rect">
-            <a:avLst/>
-          </a:prstGeom>
-        </p:spPr>
-      </p:pic>
     </p:spTree>
     <p:extLst>
       <p:ext uri="{BB962C8B-B14F-4D97-AF65-F5344CB8AC3E}">
-        <p14:creationId xmlns:p14="http://schemas.microsoft.com/office/powerpoint/2010/main" val="205647370"/>
+        <p14:creationId xmlns:p14="http://schemas.microsoft.com/office/powerpoint/2010/main" val="635310497"/>
       </p:ext>
     </p:extLst>
   </p:cSld>
   <p:clrMapOvr>
     <a:masterClrMapping/>
   </p:clrMapOvr>
-  <p:timing>
-    <p:tnLst>
-      <p:par>
-        <p:cTn id="1" dur="indefinite" restart="never" nodeType="tmRoot">
-          <p:childTnLst>
-            <p:seq concurrent="1" nextAc="seek">
-              <p:cTn id="2" dur="indefinite" nodeType="mainSeq">
-                <p:childTnLst>
-                  <p:par>
-                    <p:cTn id="3" fill="hold" nodeType="clickPar">
-                      <p:stCondLst>
-                        <p:cond delay="indefinite"/>
-                      </p:stCondLst>
-                      <p:childTnLst>
-                        <p:par>
-                          <p:cTn id="4" fill="hold" nodeType="withGroup">
-                            <p:stCondLst>
-                              <p:cond delay="0"/>
-                            </p:stCondLst>
-                            <p:childTnLst>
-                              <p:par>
-                                <p:cTn id="5" presetID="9" presetClass="entr" presetSubtype="0" fill="hold" grpId="0" nodeType="clickEffect">
-                                  <p:stCondLst>
-                                    <p:cond delay="0"/>
-                                  </p:stCondLst>
-                                  <p:childTnLst>
-                                    <p:set>
-                                      <p:cBhvr>
-                                        <p:cTn id="6" dur="1" fill="hold">
-                                          <p:stCondLst>
-                                            <p:cond delay="0"/>
-                                          </p:stCondLst>
-                                        </p:cTn>
-                                        <p:tgtEl>
-                                          <p:spTgt spid="44037"/>
-                                        </p:tgtEl>
-                                        <p:attrNameLst>
-                                          <p:attrName>style.visibility</p:attrName>
-                                        </p:attrNameLst>
-                                      </p:cBhvr>
-                                      <p:to>
-                                        <p:strVal val="visible"/>
-                                      </p:to>
-                                    </p:set>
-                                    <p:animEffect transition="in" filter="dissolve">
-                                      <p:cBhvr>
-                                        <p:cTn id="7" dur="500"/>
-                                        <p:tgtEl>
-                                          <p:spTgt spid="44037"/>
-                                        </p:tgtEl>
-                                      </p:cBhvr>
-                                    </p:animEffect>
-                                  </p:childTnLst>
-                                </p:cTn>
-                              </p:par>
-                            </p:childTnLst>
-                          </p:cTn>
-                        </p:par>
-                      </p:childTnLst>
-                    </p:cTn>
-                  </p:par>
-                </p:childTnLst>
-              </p:cTn>
-              <p:prevCondLst>
-                <p:cond evt="onPrev" delay="0">
-                  <p:tgtEl>
-                    <p:sldTgt/>
-                  </p:tgtEl>
-                </p:cond>
-              </p:prevCondLst>
-              <p:nextCondLst>
-                <p:cond evt="onNext" delay="0">
-                  <p:tgtEl>
-                    <p:sldTgt/>
-                  </p:tgtEl>
-                </p:cond>
-              </p:nextCondLst>
-            </p:seq>
-          </p:childTnLst>
-        </p:cTn>
-      </p:par>
-    </p:tnLst>
-    <p:bldLst>
-      <p:bldP spid="44037" grpId="0" animBg="1"/>
-    </p:bldLst>
-  </p:timing>
 </p:sld>
 </file>
 
@@ -8124,72 +8958,98 @@
       </p:grpSpPr>
       <p:sp>
         <p:nvSpPr>
-          <p:cNvPr id="46082" name="Rectangle 2"/>
+          <p:cNvPr id="2" name="Title 1">
+            <a:extLst>
+              <a:ext uri="{FF2B5EF4-FFF2-40B4-BE49-F238E27FC236}">
+                <a16:creationId xmlns:a16="http://schemas.microsoft.com/office/drawing/2014/main" id="{371AD885-CBAA-4AC7-AA55-456B78CA6EE5}"/>
+              </a:ext>
+            </a:extLst>
+          </p:cNvPr>
           <p:cNvSpPr>
-            <a:spLocks noGrp="1" noChangeArrowheads="1"/>
+            <a:spLocks noGrp="1"/>
           </p:cNvSpPr>
           <p:nvPr>
             <p:ph type="title"/>
           </p:nvPr>
         </p:nvSpPr>
-        <p:spPr>
-          <a:xfrm>
-            <a:off x="1981200" y="-152400"/>
-            <a:ext cx="8229600" cy="1143000"/>
-          </a:xfrm>
-        </p:spPr>
+        <p:spPr/>
         <p:txBody>
           <a:bodyPr/>
           <a:lstStyle/>
           <a:p>
             <a:r>
-              <a:rPr lang="en-US" altLang="en-US" sz="3200" dirty="0"/>
-              <a:t>Convert to CPS form – part 1</a:t>
-            </a:r>
-            <a:br>
-              <a:rPr lang="en-US" altLang="en-US" sz="3200" dirty="0"/>
-            </a:br>
-            <a:r>
-              <a:rPr lang="en-US" altLang="en-US" sz="2400" dirty="0"/>
-              <a:t>Represent continuations as Scheme procedures</a:t>
+              <a:rPr lang="en-US" dirty="0"/>
+              <a:t>Imperative form</a:t>
             </a:r>
           </a:p>
         </p:txBody>
       </p:sp>
-      <p:pic>
-        <p:nvPicPr>
-          <p:cNvPr id="2" name="Picture 1">
+      <p:sp>
+        <p:nvSpPr>
+          <p:cNvPr id="3" name="Content Placeholder 2">
             <a:extLst>
               <a:ext uri="{FF2B5EF4-FFF2-40B4-BE49-F238E27FC236}">
-                <a16:creationId xmlns:a16="http://schemas.microsoft.com/office/drawing/2014/main" id="{199C4AA1-7370-465E-920A-BCF431B9DC15}"/>
+                <a16:creationId xmlns:a16="http://schemas.microsoft.com/office/drawing/2014/main" id="{D7116619-236A-4C8E-B34F-42D0A491F917}"/>
               </a:ext>
             </a:extLst>
           </p:cNvPr>
-          <p:cNvPicPr>
-            <a:picLocks noChangeAspect="1"/>
-          </p:cNvPicPr>
-          <p:nvPr/>
-        </p:nvPicPr>
-        <p:blipFill>
-          <a:blip r:embed="rId2"/>
-          <a:stretch>
-            <a:fillRect/>
-          </a:stretch>
-        </p:blipFill>
-        <p:spPr>
-          <a:xfrm>
-            <a:off x="1676400" y="963769"/>
-            <a:ext cx="8839200" cy="6055387"/>
-          </a:xfrm>
-          <a:prstGeom prst="rect">
-            <a:avLst/>
-          </a:prstGeom>
-        </p:spPr>
-      </p:pic>
+          <p:cNvSpPr>
+            <a:spLocks noGrp="1"/>
+          </p:cNvSpPr>
+          <p:nvPr>
+            <p:ph idx="1"/>
+          </p:nvPr>
+        </p:nvSpPr>
+        <p:spPr/>
+        <p:txBody>
+          <a:bodyPr/>
+          <a:lstStyle/>
+          <a:p>
+            <a:r>
+              <a:rPr lang="en-US" dirty="0"/>
+              <a:t>Imperative form is a final transformation, that transforms cps-</a:t>
+            </a:r>
+            <a:r>
+              <a:rPr lang="en-US" dirty="0" err="1"/>
+              <a:t>ized</a:t>
+            </a:r>
+            <a:r>
+              <a:rPr lang="en-US" dirty="0"/>
+              <a:t> code into code that relies on sets and </a:t>
+            </a:r>
+            <a:r>
+              <a:rPr lang="en-US" dirty="0" err="1"/>
+              <a:t>gotos</a:t>
+            </a:r>
+            <a:endParaRPr lang="en-US" dirty="0"/>
+          </a:p>
+          <a:p>
+            <a:r>
+              <a:rPr lang="en-US" dirty="0"/>
+              <a:t>This is a form that is very close to what you’d need to actually run the code on a processor with assembly language</a:t>
+            </a:r>
+          </a:p>
+          <a:p>
+            <a:r>
+              <a:rPr lang="en-US" dirty="0"/>
+              <a:t>To build a scheme complier: regular scheme -&gt; cps scheme -&gt; imperative form scheme -&gt; assembly language</a:t>
+            </a:r>
+          </a:p>
+          <a:p>
+            <a:pPr marL="0" indent="0">
+              <a:buNone/>
+            </a:pPr>
+            <a:r>
+              <a:rPr lang="en-US" dirty="0"/>
+              <a:t>* data structures, garbage collection</a:t>
+            </a:r>
+          </a:p>
+        </p:txBody>
+      </p:sp>
     </p:spTree>
     <p:extLst>
       <p:ext uri="{BB962C8B-B14F-4D97-AF65-F5344CB8AC3E}">
-        <p14:creationId xmlns:p14="http://schemas.microsoft.com/office/powerpoint/2010/main" val="770179527"/>
+        <p14:creationId xmlns:p14="http://schemas.microsoft.com/office/powerpoint/2010/main" val="1348873358"/>
       </p:ext>
     </p:extLst>
   </p:cSld>

</xml_diff>